<commit_message>
Documentation changes to outline the pipeline and file changes. Also increase in clarity.
</commit_message>
<xml_diff>
--- a/docs/MethyCoverageParser_Image.pptx
+++ b/docs/MethyCoverageParser_Image.pptx
@@ -2,12 +2,12 @@
 <file path=ppt/presentation.xml><?xml version="1.0" encoding="utf-8"?>
 <p:presentation xmlns:a="http://schemas.openxmlformats.org/drawingml/2006/main" xmlns:r="http://schemas.openxmlformats.org/officeDocument/2006/relationships" xmlns:p="http://schemas.openxmlformats.org/presentationml/2006/main" saveSubsetFonts="1">
   <p:sldMasterIdLst>
-    <p:sldMasterId id="2147483720" r:id="rId1"/>
+    <p:sldMasterId id="2147483756" r:id="rId1"/>
   </p:sldMasterIdLst>
   <p:sldIdLst>
     <p:sldId id="256" r:id="rId2"/>
   </p:sldIdLst>
-  <p:sldSz cx="9917113" cy="12192000"/>
+  <p:sldSz cx="9197975" cy="10752138"/>
   <p:notesSz cx="6858000" cy="9144000"/>
   <p:defaultTextStyle>
     <a:defPPr>
@@ -141,15 +141,15 @@
         </p:nvSpPr>
         <p:spPr>
           <a:xfrm>
-            <a:off x="743784" y="1995312"/>
-            <a:ext cx="8429546" cy="4244622"/>
+            <a:off x="689848" y="1759668"/>
+            <a:ext cx="7818279" cy="3743337"/>
           </a:xfrm>
         </p:spPr>
         <p:txBody>
           <a:bodyPr anchor="b"/>
           <a:lstStyle>
             <a:lvl1pPr algn="ctr">
-              <a:defRPr sz="6507"/>
+              <a:defRPr sz="6035"/>
             </a:lvl1pPr>
           </a:lstStyle>
           <a:p>
@@ -173,8 +173,8 @@
         </p:nvSpPr>
         <p:spPr>
           <a:xfrm>
-            <a:off x="1239639" y="6403623"/>
-            <a:ext cx="7437835" cy="2943577"/>
+            <a:off x="1149747" y="5647362"/>
+            <a:ext cx="6898481" cy="2595944"/>
           </a:xfrm>
         </p:spPr>
         <p:txBody>
@@ -182,39 +182,39 @@
           <a:lstStyle>
             <a:lvl1pPr marL="0" indent="0" algn="ctr">
               <a:buNone/>
-              <a:defRPr sz="2603"/>
+              <a:defRPr sz="2414"/>
             </a:lvl1pPr>
-            <a:lvl2pPr marL="495833" indent="0" algn="ctr">
-              <a:buNone/>
-              <a:defRPr sz="2169"/>
+            <a:lvl2pPr marL="459897" indent="0" algn="ctr">
+              <a:buNone/>
+              <a:defRPr sz="2012"/>
             </a:lvl2pPr>
-            <a:lvl3pPr marL="991667" indent="0" algn="ctr">
-              <a:buNone/>
-              <a:defRPr sz="1952"/>
+            <a:lvl3pPr marL="919795" indent="0" algn="ctr">
+              <a:buNone/>
+              <a:defRPr sz="1811"/>
             </a:lvl3pPr>
-            <a:lvl4pPr marL="1487500" indent="0" algn="ctr">
-              <a:buNone/>
-              <a:defRPr sz="1735"/>
+            <a:lvl4pPr marL="1379692" indent="0" algn="ctr">
+              <a:buNone/>
+              <a:defRPr sz="1609"/>
             </a:lvl4pPr>
-            <a:lvl5pPr marL="1983334" indent="0" algn="ctr">
-              <a:buNone/>
-              <a:defRPr sz="1735"/>
+            <a:lvl5pPr marL="1839590" indent="0" algn="ctr">
+              <a:buNone/>
+              <a:defRPr sz="1609"/>
             </a:lvl5pPr>
-            <a:lvl6pPr marL="2479167" indent="0" algn="ctr">
-              <a:buNone/>
-              <a:defRPr sz="1735"/>
+            <a:lvl6pPr marL="2299487" indent="0" algn="ctr">
+              <a:buNone/>
+              <a:defRPr sz="1609"/>
             </a:lvl6pPr>
-            <a:lvl7pPr marL="2975000" indent="0" algn="ctr">
-              <a:buNone/>
-              <a:defRPr sz="1735"/>
+            <a:lvl7pPr marL="2759385" indent="0" algn="ctr">
+              <a:buNone/>
+              <a:defRPr sz="1609"/>
             </a:lvl7pPr>
-            <a:lvl8pPr marL="3470834" indent="0" algn="ctr">
-              <a:buNone/>
-              <a:defRPr sz="1735"/>
+            <a:lvl8pPr marL="3219282" indent="0" algn="ctr">
+              <a:buNone/>
+              <a:defRPr sz="1609"/>
             </a:lvl8pPr>
-            <a:lvl9pPr marL="3966667" indent="0" algn="ctr">
-              <a:buNone/>
-              <a:defRPr sz="1735"/>
+            <a:lvl9pPr marL="3679180" indent="0" algn="ctr">
+              <a:buNone/>
+              <a:defRPr sz="1609"/>
             </a:lvl9pPr>
           </a:lstStyle>
           <a:p>
@@ -243,7 +243,7 @@
           <a:p>
             <a:fld id="{BEB28509-2F36-408F-997B-EE4701DD66B7}" type="datetimeFigureOut">
               <a:rPr lang="en-GB" smtClean="0"/>
-              <a:t>17/05/2017</a:t>
+              <a:t>19/05/2017</a:t>
             </a:fld>
             <a:endParaRPr lang="en-GB"/>
           </a:p>
@@ -294,7 +294,7 @@
     </p:spTree>
     <p:extLst>
       <p:ext uri="{BB962C8B-B14F-4D97-AF65-F5344CB8AC3E}">
-        <p14:creationId xmlns:p14="http://schemas.microsoft.com/office/powerpoint/2010/main" val="2754843086"/>
+        <p14:creationId xmlns:p14="http://schemas.microsoft.com/office/powerpoint/2010/main" val="895004442"/>
       </p:ext>
     </p:extLst>
   </p:cSld>
@@ -413,7 +413,7 @@
           <a:p>
             <a:fld id="{BEB28509-2F36-408F-997B-EE4701DD66B7}" type="datetimeFigureOut">
               <a:rPr lang="en-GB" smtClean="0"/>
-              <a:t>17/05/2017</a:t>
+              <a:t>19/05/2017</a:t>
             </a:fld>
             <a:endParaRPr lang="en-GB"/>
           </a:p>
@@ -464,7 +464,7 @@
     </p:spTree>
     <p:extLst>
       <p:ext uri="{BB962C8B-B14F-4D97-AF65-F5344CB8AC3E}">
-        <p14:creationId xmlns:p14="http://schemas.microsoft.com/office/powerpoint/2010/main" val="2813279375"/>
+        <p14:creationId xmlns:p14="http://schemas.microsoft.com/office/powerpoint/2010/main" val="761490490"/>
       </p:ext>
     </p:extLst>
   </p:cSld>
@@ -503,8 +503,8 @@
         </p:nvSpPr>
         <p:spPr>
           <a:xfrm>
-            <a:off x="7096935" y="649111"/>
-            <a:ext cx="2138377" cy="10332156"/>
+            <a:off x="6582302" y="572452"/>
+            <a:ext cx="1983313" cy="9111940"/>
           </a:xfrm>
         </p:spPr>
         <p:txBody>
@@ -531,8 +531,8 @@
         </p:nvSpPr>
         <p:spPr>
           <a:xfrm>
-            <a:off x="681802" y="649111"/>
-            <a:ext cx="6291169" cy="10332156"/>
+            <a:off x="632361" y="572452"/>
+            <a:ext cx="5834965" cy="9111940"/>
           </a:xfrm>
         </p:spPr>
         <p:txBody>
@@ -593,7 +593,7 @@
           <a:p>
             <a:fld id="{BEB28509-2F36-408F-997B-EE4701DD66B7}" type="datetimeFigureOut">
               <a:rPr lang="en-GB" smtClean="0"/>
-              <a:t>17/05/2017</a:t>
+              <a:t>19/05/2017</a:t>
             </a:fld>
             <a:endParaRPr lang="en-GB"/>
           </a:p>
@@ -644,7 +644,7 @@
     </p:spTree>
     <p:extLst>
       <p:ext uri="{BB962C8B-B14F-4D97-AF65-F5344CB8AC3E}">
-        <p14:creationId xmlns:p14="http://schemas.microsoft.com/office/powerpoint/2010/main" val="2538061794"/>
+        <p14:creationId xmlns:p14="http://schemas.microsoft.com/office/powerpoint/2010/main" val="3148393198"/>
       </p:ext>
     </p:extLst>
   </p:cSld>
@@ -763,7 +763,7 @@
           <a:p>
             <a:fld id="{BEB28509-2F36-408F-997B-EE4701DD66B7}" type="datetimeFigureOut">
               <a:rPr lang="en-GB" smtClean="0"/>
-              <a:t>17/05/2017</a:t>
+              <a:t>19/05/2017</a:t>
             </a:fld>
             <a:endParaRPr lang="en-GB"/>
           </a:p>
@@ -814,7 +814,7 @@
     </p:spTree>
     <p:extLst>
       <p:ext uri="{BB962C8B-B14F-4D97-AF65-F5344CB8AC3E}">
-        <p14:creationId xmlns:p14="http://schemas.microsoft.com/office/powerpoint/2010/main" val="3627019494"/>
+        <p14:creationId xmlns:p14="http://schemas.microsoft.com/office/powerpoint/2010/main" val="1539188358"/>
       </p:ext>
     </p:extLst>
   </p:cSld>
@@ -853,15 +853,15 @@
         </p:nvSpPr>
         <p:spPr>
           <a:xfrm>
-            <a:off x="676637" y="3039537"/>
-            <a:ext cx="8553510" cy="5071532"/>
+            <a:off x="627571" y="2680571"/>
+            <a:ext cx="7933253" cy="4472590"/>
           </a:xfrm>
         </p:spPr>
         <p:txBody>
           <a:bodyPr anchor="b"/>
           <a:lstStyle>
             <a:lvl1pPr>
-              <a:defRPr sz="6507"/>
+              <a:defRPr sz="6035"/>
             </a:lvl1pPr>
           </a:lstStyle>
           <a:p>
@@ -885,8 +885,8 @@
         </p:nvSpPr>
         <p:spPr>
           <a:xfrm>
-            <a:off x="676637" y="8159048"/>
-            <a:ext cx="8553510" cy="2666999"/>
+            <a:off x="627571" y="7195473"/>
+            <a:ext cx="7933253" cy="2352029"/>
           </a:xfrm>
         </p:spPr>
         <p:txBody>
@@ -894,15 +894,15 @@
           <a:lstStyle>
             <a:lvl1pPr marL="0" indent="0">
               <a:buNone/>
-              <a:defRPr sz="2603">
+              <a:defRPr sz="2414">
                 <a:solidFill>
                   <a:schemeClr val="tx1"/>
                 </a:solidFill>
               </a:defRPr>
             </a:lvl1pPr>
-            <a:lvl2pPr marL="495833" indent="0">
-              <a:buNone/>
-              <a:defRPr sz="2169">
+            <a:lvl2pPr marL="459897" indent="0">
+              <a:buNone/>
+              <a:defRPr sz="2012">
                 <a:solidFill>
                   <a:schemeClr val="tx1">
                     <a:tint val="75000"/>
@@ -910,9 +910,9 @@
                 </a:solidFill>
               </a:defRPr>
             </a:lvl2pPr>
-            <a:lvl3pPr marL="991667" indent="0">
-              <a:buNone/>
-              <a:defRPr sz="1952">
+            <a:lvl3pPr marL="919795" indent="0">
+              <a:buNone/>
+              <a:defRPr sz="1811">
                 <a:solidFill>
                   <a:schemeClr val="tx1">
                     <a:tint val="75000"/>
@@ -920,9 +920,9 @@
                 </a:solidFill>
               </a:defRPr>
             </a:lvl3pPr>
-            <a:lvl4pPr marL="1487500" indent="0">
-              <a:buNone/>
-              <a:defRPr sz="1735">
+            <a:lvl4pPr marL="1379692" indent="0">
+              <a:buNone/>
+              <a:defRPr sz="1609">
                 <a:solidFill>
                   <a:schemeClr val="tx1">
                     <a:tint val="75000"/>
@@ -930,9 +930,9 @@
                 </a:solidFill>
               </a:defRPr>
             </a:lvl4pPr>
-            <a:lvl5pPr marL="1983334" indent="0">
-              <a:buNone/>
-              <a:defRPr sz="1735">
+            <a:lvl5pPr marL="1839590" indent="0">
+              <a:buNone/>
+              <a:defRPr sz="1609">
                 <a:solidFill>
                   <a:schemeClr val="tx1">
                     <a:tint val="75000"/>
@@ -940,9 +940,9 @@
                 </a:solidFill>
               </a:defRPr>
             </a:lvl5pPr>
-            <a:lvl6pPr marL="2479167" indent="0">
-              <a:buNone/>
-              <a:defRPr sz="1735">
+            <a:lvl6pPr marL="2299487" indent="0">
+              <a:buNone/>
+              <a:defRPr sz="1609">
                 <a:solidFill>
                   <a:schemeClr val="tx1">
                     <a:tint val="75000"/>
@@ -950,9 +950,9 @@
                 </a:solidFill>
               </a:defRPr>
             </a:lvl6pPr>
-            <a:lvl7pPr marL="2975000" indent="0">
-              <a:buNone/>
-              <a:defRPr sz="1735">
+            <a:lvl7pPr marL="2759385" indent="0">
+              <a:buNone/>
+              <a:defRPr sz="1609">
                 <a:solidFill>
                   <a:schemeClr val="tx1">
                     <a:tint val="75000"/>
@@ -960,9 +960,9 @@
                 </a:solidFill>
               </a:defRPr>
             </a:lvl7pPr>
-            <a:lvl8pPr marL="3470834" indent="0">
-              <a:buNone/>
-              <a:defRPr sz="1735">
+            <a:lvl8pPr marL="3219282" indent="0">
+              <a:buNone/>
+              <a:defRPr sz="1609">
                 <a:solidFill>
                   <a:schemeClr val="tx1">
                     <a:tint val="75000"/>
@@ -970,9 +970,9 @@
                 </a:solidFill>
               </a:defRPr>
             </a:lvl8pPr>
-            <a:lvl9pPr marL="3966667" indent="0">
-              <a:buNone/>
-              <a:defRPr sz="1735">
+            <a:lvl9pPr marL="3679180" indent="0">
+              <a:buNone/>
+              <a:defRPr sz="1609">
                 <a:solidFill>
                   <a:schemeClr val="tx1">
                     <a:tint val="75000"/>
@@ -1007,7 +1007,7 @@
           <a:p>
             <a:fld id="{BEB28509-2F36-408F-997B-EE4701DD66B7}" type="datetimeFigureOut">
               <a:rPr lang="en-GB" smtClean="0"/>
-              <a:t>17/05/2017</a:t>
+              <a:t>19/05/2017</a:t>
             </a:fld>
             <a:endParaRPr lang="en-GB"/>
           </a:p>
@@ -1058,7 +1058,7 @@
     </p:spTree>
     <p:extLst>
       <p:ext uri="{BB962C8B-B14F-4D97-AF65-F5344CB8AC3E}">
-        <p14:creationId xmlns:p14="http://schemas.microsoft.com/office/powerpoint/2010/main" val="856622021"/>
+        <p14:creationId xmlns:p14="http://schemas.microsoft.com/office/powerpoint/2010/main" val="329880308"/>
       </p:ext>
     </p:extLst>
   </p:cSld>
@@ -1120,8 +1120,8 @@
         </p:nvSpPr>
         <p:spPr>
           <a:xfrm>
-            <a:off x="681802" y="3245556"/>
-            <a:ext cx="4214773" cy="7735712"/>
+            <a:off x="632361" y="2862259"/>
+            <a:ext cx="3909139" cy="6822133"/>
           </a:xfrm>
         </p:spPr>
         <p:txBody>
@@ -1177,8 +1177,8 @@
         </p:nvSpPr>
         <p:spPr>
           <a:xfrm>
-            <a:off x="5020538" y="3245556"/>
-            <a:ext cx="4214773" cy="7735712"/>
+            <a:off x="4656475" y="2862259"/>
+            <a:ext cx="3909139" cy="6822133"/>
           </a:xfrm>
         </p:spPr>
         <p:txBody>
@@ -1239,7 +1239,7 @@
           <a:p>
             <a:fld id="{BEB28509-2F36-408F-997B-EE4701DD66B7}" type="datetimeFigureOut">
               <a:rPr lang="en-GB" smtClean="0"/>
-              <a:t>17/05/2017</a:t>
+              <a:t>19/05/2017</a:t>
             </a:fld>
             <a:endParaRPr lang="en-GB"/>
           </a:p>
@@ -1290,7 +1290,7 @@
     </p:spTree>
     <p:extLst>
       <p:ext uri="{BB962C8B-B14F-4D97-AF65-F5344CB8AC3E}">
-        <p14:creationId xmlns:p14="http://schemas.microsoft.com/office/powerpoint/2010/main" val="3079335248"/>
+        <p14:creationId xmlns:p14="http://schemas.microsoft.com/office/powerpoint/2010/main" val="2399847280"/>
       </p:ext>
     </p:extLst>
   </p:cSld>
@@ -1329,8 +1329,8 @@
         </p:nvSpPr>
         <p:spPr>
           <a:xfrm>
-            <a:off x="683093" y="649114"/>
-            <a:ext cx="8553510" cy="2356556"/>
+            <a:off x="633559" y="572454"/>
+            <a:ext cx="7933253" cy="2078250"/>
           </a:xfrm>
         </p:spPr>
         <p:txBody>
@@ -1357,8 +1357,8 @@
         </p:nvSpPr>
         <p:spPr>
           <a:xfrm>
-            <a:off x="683094" y="2988734"/>
-            <a:ext cx="4195403" cy="1464732"/>
+            <a:off x="633560" y="2635768"/>
+            <a:ext cx="3891174" cy="1291749"/>
           </a:xfrm>
         </p:spPr>
         <p:txBody>
@@ -1366,39 +1366,39 @@
           <a:lstStyle>
             <a:lvl1pPr marL="0" indent="0">
               <a:buNone/>
-              <a:defRPr sz="2603" b="1"/>
+              <a:defRPr sz="2414" b="1"/>
             </a:lvl1pPr>
-            <a:lvl2pPr marL="495833" indent="0">
-              <a:buNone/>
-              <a:defRPr sz="2169" b="1"/>
+            <a:lvl2pPr marL="459897" indent="0">
+              <a:buNone/>
+              <a:defRPr sz="2012" b="1"/>
             </a:lvl2pPr>
-            <a:lvl3pPr marL="991667" indent="0">
-              <a:buNone/>
-              <a:defRPr sz="1952" b="1"/>
+            <a:lvl3pPr marL="919795" indent="0">
+              <a:buNone/>
+              <a:defRPr sz="1811" b="1"/>
             </a:lvl3pPr>
-            <a:lvl4pPr marL="1487500" indent="0">
-              <a:buNone/>
-              <a:defRPr sz="1735" b="1"/>
+            <a:lvl4pPr marL="1379692" indent="0">
+              <a:buNone/>
+              <a:defRPr sz="1609" b="1"/>
             </a:lvl4pPr>
-            <a:lvl5pPr marL="1983334" indent="0">
-              <a:buNone/>
-              <a:defRPr sz="1735" b="1"/>
+            <a:lvl5pPr marL="1839590" indent="0">
+              <a:buNone/>
+              <a:defRPr sz="1609" b="1"/>
             </a:lvl5pPr>
-            <a:lvl6pPr marL="2479167" indent="0">
-              <a:buNone/>
-              <a:defRPr sz="1735" b="1"/>
+            <a:lvl6pPr marL="2299487" indent="0">
+              <a:buNone/>
+              <a:defRPr sz="1609" b="1"/>
             </a:lvl6pPr>
-            <a:lvl7pPr marL="2975000" indent="0">
-              <a:buNone/>
-              <a:defRPr sz="1735" b="1"/>
+            <a:lvl7pPr marL="2759385" indent="0">
+              <a:buNone/>
+              <a:defRPr sz="1609" b="1"/>
             </a:lvl7pPr>
-            <a:lvl8pPr marL="3470834" indent="0">
-              <a:buNone/>
-              <a:defRPr sz="1735" b="1"/>
+            <a:lvl8pPr marL="3219282" indent="0">
+              <a:buNone/>
+              <a:defRPr sz="1609" b="1"/>
             </a:lvl8pPr>
-            <a:lvl9pPr marL="3966667" indent="0">
-              <a:buNone/>
-              <a:defRPr sz="1735" b="1"/>
+            <a:lvl9pPr marL="3679180" indent="0">
+              <a:buNone/>
+              <a:defRPr sz="1609" b="1"/>
             </a:lvl9pPr>
           </a:lstStyle>
           <a:p>
@@ -1422,8 +1422,8 @@
         </p:nvSpPr>
         <p:spPr>
           <a:xfrm>
-            <a:off x="683094" y="4453467"/>
-            <a:ext cx="4195403" cy="6550379"/>
+            <a:off x="633560" y="3927517"/>
+            <a:ext cx="3891174" cy="5776786"/>
           </a:xfrm>
         </p:spPr>
         <p:txBody>
@@ -1479,8 +1479,8 @@
         </p:nvSpPr>
         <p:spPr>
           <a:xfrm>
-            <a:off x="5020539" y="2988734"/>
-            <a:ext cx="4216065" cy="1464732"/>
+            <a:off x="4656476" y="2635768"/>
+            <a:ext cx="3910337" cy="1291749"/>
           </a:xfrm>
         </p:spPr>
         <p:txBody>
@@ -1488,39 +1488,39 @@
           <a:lstStyle>
             <a:lvl1pPr marL="0" indent="0">
               <a:buNone/>
-              <a:defRPr sz="2603" b="1"/>
+              <a:defRPr sz="2414" b="1"/>
             </a:lvl1pPr>
-            <a:lvl2pPr marL="495833" indent="0">
-              <a:buNone/>
-              <a:defRPr sz="2169" b="1"/>
+            <a:lvl2pPr marL="459897" indent="0">
+              <a:buNone/>
+              <a:defRPr sz="2012" b="1"/>
             </a:lvl2pPr>
-            <a:lvl3pPr marL="991667" indent="0">
-              <a:buNone/>
-              <a:defRPr sz="1952" b="1"/>
+            <a:lvl3pPr marL="919795" indent="0">
+              <a:buNone/>
+              <a:defRPr sz="1811" b="1"/>
             </a:lvl3pPr>
-            <a:lvl4pPr marL="1487500" indent="0">
-              <a:buNone/>
-              <a:defRPr sz="1735" b="1"/>
+            <a:lvl4pPr marL="1379692" indent="0">
+              <a:buNone/>
+              <a:defRPr sz="1609" b="1"/>
             </a:lvl4pPr>
-            <a:lvl5pPr marL="1983334" indent="0">
-              <a:buNone/>
-              <a:defRPr sz="1735" b="1"/>
+            <a:lvl5pPr marL="1839590" indent="0">
+              <a:buNone/>
+              <a:defRPr sz="1609" b="1"/>
             </a:lvl5pPr>
-            <a:lvl6pPr marL="2479167" indent="0">
-              <a:buNone/>
-              <a:defRPr sz="1735" b="1"/>
+            <a:lvl6pPr marL="2299487" indent="0">
+              <a:buNone/>
+              <a:defRPr sz="1609" b="1"/>
             </a:lvl6pPr>
-            <a:lvl7pPr marL="2975000" indent="0">
-              <a:buNone/>
-              <a:defRPr sz="1735" b="1"/>
+            <a:lvl7pPr marL="2759385" indent="0">
+              <a:buNone/>
+              <a:defRPr sz="1609" b="1"/>
             </a:lvl7pPr>
-            <a:lvl8pPr marL="3470834" indent="0">
-              <a:buNone/>
-              <a:defRPr sz="1735" b="1"/>
+            <a:lvl8pPr marL="3219282" indent="0">
+              <a:buNone/>
+              <a:defRPr sz="1609" b="1"/>
             </a:lvl8pPr>
-            <a:lvl9pPr marL="3966667" indent="0">
-              <a:buNone/>
-              <a:defRPr sz="1735" b="1"/>
+            <a:lvl9pPr marL="3679180" indent="0">
+              <a:buNone/>
+              <a:defRPr sz="1609" b="1"/>
             </a:lvl9pPr>
           </a:lstStyle>
           <a:p>
@@ -1544,8 +1544,8 @@
         </p:nvSpPr>
         <p:spPr>
           <a:xfrm>
-            <a:off x="5020539" y="4453467"/>
-            <a:ext cx="4216065" cy="6550379"/>
+            <a:off x="4656476" y="3927517"/>
+            <a:ext cx="3910337" cy="5776786"/>
           </a:xfrm>
         </p:spPr>
         <p:txBody>
@@ -1606,7 +1606,7 @@
           <a:p>
             <a:fld id="{BEB28509-2F36-408F-997B-EE4701DD66B7}" type="datetimeFigureOut">
               <a:rPr lang="en-GB" smtClean="0"/>
-              <a:t>17/05/2017</a:t>
+              <a:t>19/05/2017</a:t>
             </a:fld>
             <a:endParaRPr lang="en-GB"/>
           </a:p>
@@ -1657,7 +1657,7 @@
     </p:spTree>
     <p:extLst>
       <p:ext uri="{BB962C8B-B14F-4D97-AF65-F5344CB8AC3E}">
-        <p14:creationId xmlns:p14="http://schemas.microsoft.com/office/powerpoint/2010/main" val="2576028588"/>
+        <p14:creationId xmlns:p14="http://schemas.microsoft.com/office/powerpoint/2010/main" val="3458157274"/>
       </p:ext>
     </p:extLst>
   </p:cSld>
@@ -1724,7 +1724,7 @@
           <a:p>
             <a:fld id="{BEB28509-2F36-408F-997B-EE4701DD66B7}" type="datetimeFigureOut">
               <a:rPr lang="en-GB" smtClean="0"/>
-              <a:t>17/05/2017</a:t>
+              <a:t>19/05/2017</a:t>
             </a:fld>
             <a:endParaRPr lang="en-GB"/>
           </a:p>
@@ -1775,7 +1775,7 @@
     </p:spTree>
     <p:extLst>
       <p:ext uri="{BB962C8B-B14F-4D97-AF65-F5344CB8AC3E}">
-        <p14:creationId xmlns:p14="http://schemas.microsoft.com/office/powerpoint/2010/main" val="4206753711"/>
+        <p14:creationId xmlns:p14="http://schemas.microsoft.com/office/powerpoint/2010/main" val="2535908871"/>
       </p:ext>
     </p:extLst>
   </p:cSld>
@@ -1819,7 +1819,7 @@
           <a:p>
             <a:fld id="{BEB28509-2F36-408F-997B-EE4701DD66B7}" type="datetimeFigureOut">
               <a:rPr lang="en-GB" smtClean="0"/>
-              <a:t>17/05/2017</a:t>
+              <a:t>19/05/2017</a:t>
             </a:fld>
             <a:endParaRPr lang="en-GB"/>
           </a:p>
@@ -1870,7 +1870,7 @@
     </p:spTree>
     <p:extLst>
       <p:ext uri="{BB962C8B-B14F-4D97-AF65-F5344CB8AC3E}">
-        <p14:creationId xmlns:p14="http://schemas.microsoft.com/office/powerpoint/2010/main" val="1664400506"/>
+        <p14:creationId xmlns:p14="http://schemas.microsoft.com/office/powerpoint/2010/main" val="2511794550"/>
       </p:ext>
     </p:extLst>
   </p:cSld>
@@ -1909,15 +1909,15 @@
         </p:nvSpPr>
         <p:spPr>
           <a:xfrm>
-            <a:off x="683093" y="812800"/>
-            <a:ext cx="3198527" cy="2844800"/>
+            <a:off x="633559" y="716809"/>
+            <a:ext cx="2966586" cy="2508832"/>
           </a:xfrm>
         </p:spPr>
         <p:txBody>
           <a:bodyPr anchor="b"/>
           <a:lstStyle>
             <a:lvl1pPr>
-              <a:defRPr sz="3470"/>
+              <a:defRPr sz="3219"/>
             </a:lvl1pPr>
           </a:lstStyle>
           <a:p>
@@ -1941,39 +1941,39 @@
         </p:nvSpPr>
         <p:spPr>
           <a:xfrm>
-            <a:off x="4216065" y="1755425"/>
-            <a:ext cx="5020538" cy="8664222"/>
+            <a:off x="3910337" y="1548111"/>
+            <a:ext cx="4656475" cy="7640987"/>
           </a:xfrm>
         </p:spPr>
         <p:txBody>
           <a:bodyPr/>
           <a:lstStyle>
             <a:lvl1pPr>
-              <a:defRPr sz="3470"/>
+              <a:defRPr sz="3219"/>
             </a:lvl1pPr>
             <a:lvl2pPr>
-              <a:defRPr sz="3037"/>
+              <a:defRPr sz="2817"/>
             </a:lvl2pPr>
             <a:lvl3pPr>
-              <a:defRPr sz="2603"/>
+              <a:defRPr sz="2414"/>
             </a:lvl3pPr>
             <a:lvl4pPr>
-              <a:defRPr sz="2169"/>
+              <a:defRPr sz="2012"/>
             </a:lvl4pPr>
             <a:lvl5pPr>
-              <a:defRPr sz="2169"/>
+              <a:defRPr sz="2012"/>
             </a:lvl5pPr>
             <a:lvl6pPr>
-              <a:defRPr sz="2169"/>
+              <a:defRPr sz="2012"/>
             </a:lvl6pPr>
             <a:lvl7pPr>
-              <a:defRPr sz="2169"/>
+              <a:defRPr sz="2012"/>
             </a:lvl7pPr>
             <a:lvl8pPr>
-              <a:defRPr sz="2169"/>
+              <a:defRPr sz="2012"/>
             </a:lvl8pPr>
             <a:lvl9pPr>
-              <a:defRPr sz="2169"/>
+              <a:defRPr sz="2012"/>
             </a:lvl9pPr>
           </a:lstStyle>
           <a:p>
@@ -2026,8 +2026,8 @@
         </p:nvSpPr>
         <p:spPr>
           <a:xfrm>
-            <a:off x="683093" y="3657600"/>
-            <a:ext cx="3198527" cy="6776156"/>
+            <a:off x="633559" y="3225641"/>
+            <a:ext cx="2966586" cy="5975900"/>
           </a:xfrm>
         </p:spPr>
         <p:txBody>
@@ -2035,39 +2035,39 @@
           <a:lstStyle>
             <a:lvl1pPr marL="0" indent="0">
               <a:buNone/>
-              <a:defRPr sz="1735"/>
+              <a:defRPr sz="1609"/>
             </a:lvl1pPr>
-            <a:lvl2pPr marL="495833" indent="0">
-              <a:buNone/>
-              <a:defRPr sz="1518"/>
+            <a:lvl2pPr marL="459897" indent="0">
+              <a:buNone/>
+              <a:defRPr sz="1408"/>
             </a:lvl2pPr>
-            <a:lvl3pPr marL="991667" indent="0">
-              <a:buNone/>
-              <a:defRPr sz="1301"/>
+            <a:lvl3pPr marL="919795" indent="0">
+              <a:buNone/>
+              <a:defRPr sz="1207"/>
             </a:lvl3pPr>
-            <a:lvl4pPr marL="1487500" indent="0">
-              <a:buNone/>
-              <a:defRPr sz="1085"/>
+            <a:lvl4pPr marL="1379692" indent="0">
+              <a:buNone/>
+              <a:defRPr sz="1006"/>
             </a:lvl4pPr>
-            <a:lvl5pPr marL="1983334" indent="0">
-              <a:buNone/>
-              <a:defRPr sz="1085"/>
+            <a:lvl5pPr marL="1839590" indent="0">
+              <a:buNone/>
+              <a:defRPr sz="1006"/>
             </a:lvl5pPr>
-            <a:lvl6pPr marL="2479167" indent="0">
-              <a:buNone/>
-              <a:defRPr sz="1085"/>
+            <a:lvl6pPr marL="2299487" indent="0">
+              <a:buNone/>
+              <a:defRPr sz="1006"/>
             </a:lvl6pPr>
-            <a:lvl7pPr marL="2975000" indent="0">
-              <a:buNone/>
-              <a:defRPr sz="1085"/>
+            <a:lvl7pPr marL="2759385" indent="0">
+              <a:buNone/>
+              <a:defRPr sz="1006"/>
             </a:lvl7pPr>
-            <a:lvl8pPr marL="3470834" indent="0">
-              <a:buNone/>
-              <a:defRPr sz="1085"/>
+            <a:lvl8pPr marL="3219282" indent="0">
+              <a:buNone/>
+              <a:defRPr sz="1006"/>
             </a:lvl8pPr>
-            <a:lvl9pPr marL="3966667" indent="0">
-              <a:buNone/>
-              <a:defRPr sz="1085"/>
+            <a:lvl9pPr marL="3679180" indent="0">
+              <a:buNone/>
+              <a:defRPr sz="1006"/>
             </a:lvl9pPr>
           </a:lstStyle>
           <a:p>
@@ -2096,7 +2096,7 @@
           <a:p>
             <a:fld id="{BEB28509-2F36-408F-997B-EE4701DD66B7}" type="datetimeFigureOut">
               <a:rPr lang="en-GB" smtClean="0"/>
-              <a:t>17/05/2017</a:t>
+              <a:t>19/05/2017</a:t>
             </a:fld>
             <a:endParaRPr lang="en-GB"/>
           </a:p>
@@ -2147,7 +2147,7 @@
     </p:spTree>
     <p:extLst>
       <p:ext uri="{BB962C8B-B14F-4D97-AF65-F5344CB8AC3E}">
-        <p14:creationId xmlns:p14="http://schemas.microsoft.com/office/powerpoint/2010/main" val="3931455412"/>
+        <p14:creationId xmlns:p14="http://schemas.microsoft.com/office/powerpoint/2010/main" val="1050649616"/>
       </p:ext>
     </p:extLst>
   </p:cSld>
@@ -2186,15 +2186,15 @@
         </p:nvSpPr>
         <p:spPr>
           <a:xfrm>
-            <a:off x="683093" y="812800"/>
-            <a:ext cx="3198527" cy="2844800"/>
+            <a:off x="633559" y="716809"/>
+            <a:ext cx="2966586" cy="2508832"/>
           </a:xfrm>
         </p:spPr>
         <p:txBody>
           <a:bodyPr anchor="b"/>
           <a:lstStyle>
             <a:lvl1pPr>
-              <a:defRPr sz="3470"/>
+              <a:defRPr sz="3219"/>
             </a:lvl1pPr>
           </a:lstStyle>
           <a:p>
@@ -2218,8 +2218,8 @@
         </p:nvSpPr>
         <p:spPr>
           <a:xfrm>
-            <a:off x="4216065" y="1755425"/>
-            <a:ext cx="5020538" cy="8664222"/>
+            <a:off x="3910337" y="1548111"/>
+            <a:ext cx="4656475" cy="7640987"/>
           </a:xfrm>
         </p:spPr>
         <p:txBody>
@@ -2227,39 +2227,39 @@
           <a:lstStyle>
             <a:lvl1pPr marL="0" indent="0">
               <a:buNone/>
-              <a:defRPr sz="3470"/>
+              <a:defRPr sz="3219"/>
             </a:lvl1pPr>
-            <a:lvl2pPr marL="495833" indent="0">
-              <a:buNone/>
-              <a:defRPr sz="3037"/>
+            <a:lvl2pPr marL="459897" indent="0">
+              <a:buNone/>
+              <a:defRPr sz="2817"/>
             </a:lvl2pPr>
-            <a:lvl3pPr marL="991667" indent="0">
-              <a:buNone/>
-              <a:defRPr sz="2603"/>
+            <a:lvl3pPr marL="919795" indent="0">
+              <a:buNone/>
+              <a:defRPr sz="2414"/>
             </a:lvl3pPr>
-            <a:lvl4pPr marL="1487500" indent="0">
-              <a:buNone/>
-              <a:defRPr sz="2169"/>
+            <a:lvl4pPr marL="1379692" indent="0">
+              <a:buNone/>
+              <a:defRPr sz="2012"/>
             </a:lvl4pPr>
-            <a:lvl5pPr marL="1983334" indent="0">
-              <a:buNone/>
-              <a:defRPr sz="2169"/>
+            <a:lvl5pPr marL="1839590" indent="0">
+              <a:buNone/>
+              <a:defRPr sz="2012"/>
             </a:lvl5pPr>
-            <a:lvl6pPr marL="2479167" indent="0">
-              <a:buNone/>
-              <a:defRPr sz="2169"/>
+            <a:lvl6pPr marL="2299487" indent="0">
+              <a:buNone/>
+              <a:defRPr sz="2012"/>
             </a:lvl6pPr>
-            <a:lvl7pPr marL="2975000" indent="0">
-              <a:buNone/>
-              <a:defRPr sz="2169"/>
+            <a:lvl7pPr marL="2759385" indent="0">
+              <a:buNone/>
+              <a:defRPr sz="2012"/>
             </a:lvl7pPr>
-            <a:lvl8pPr marL="3470834" indent="0">
-              <a:buNone/>
-              <a:defRPr sz="2169"/>
+            <a:lvl8pPr marL="3219282" indent="0">
+              <a:buNone/>
+              <a:defRPr sz="2012"/>
             </a:lvl8pPr>
-            <a:lvl9pPr marL="3966667" indent="0">
-              <a:buNone/>
-              <a:defRPr sz="2169"/>
+            <a:lvl9pPr marL="3679180" indent="0">
+              <a:buNone/>
+              <a:defRPr sz="2012"/>
             </a:lvl9pPr>
           </a:lstStyle>
           <a:p>
@@ -2283,8 +2283,8 @@
         </p:nvSpPr>
         <p:spPr>
           <a:xfrm>
-            <a:off x="683093" y="3657600"/>
-            <a:ext cx="3198527" cy="6776156"/>
+            <a:off x="633559" y="3225641"/>
+            <a:ext cx="2966586" cy="5975900"/>
           </a:xfrm>
         </p:spPr>
         <p:txBody>
@@ -2292,39 +2292,39 @@
           <a:lstStyle>
             <a:lvl1pPr marL="0" indent="0">
               <a:buNone/>
-              <a:defRPr sz="1735"/>
+              <a:defRPr sz="1609"/>
             </a:lvl1pPr>
-            <a:lvl2pPr marL="495833" indent="0">
-              <a:buNone/>
-              <a:defRPr sz="1518"/>
+            <a:lvl2pPr marL="459897" indent="0">
+              <a:buNone/>
+              <a:defRPr sz="1408"/>
             </a:lvl2pPr>
-            <a:lvl3pPr marL="991667" indent="0">
-              <a:buNone/>
-              <a:defRPr sz="1301"/>
+            <a:lvl3pPr marL="919795" indent="0">
+              <a:buNone/>
+              <a:defRPr sz="1207"/>
             </a:lvl3pPr>
-            <a:lvl4pPr marL="1487500" indent="0">
-              <a:buNone/>
-              <a:defRPr sz="1085"/>
+            <a:lvl4pPr marL="1379692" indent="0">
+              <a:buNone/>
+              <a:defRPr sz="1006"/>
             </a:lvl4pPr>
-            <a:lvl5pPr marL="1983334" indent="0">
-              <a:buNone/>
-              <a:defRPr sz="1085"/>
+            <a:lvl5pPr marL="1839590" indent="0">
+              <a:buNone/>
+              <a:defRPr sz="1006"/>
             </a:lvl5pPr>
-            <a:lvl6pPr marL="2479167" indent="0">
-              <a:buNone/>
-              <a:defRPr sz="1085"/>
+            <a:lvl6pPr marL="2299487" indent="0">
+              <a:buNone/>
+              <a:defRPr sz="1006"/>
             </a:lvl6pPr>
-            <a:lvl7pPr marL="2975000" indent="0">
-              <a:buNone/>
-              <a:defRPr sz="1085"/>
+            <a:lvl7pPr marL="2759385" indent="0">
+              <a:buNone/>
+              <a:defRPr sz="1006"/>
             </a:lvl7pPr>
-            <a:lvl8pPr marL="3470834" indent="0">
-              <a:buNone/>
-              <a:defRPr sz="1085"/>
+            <a:lvl8pPr marL="3219282" indent="0">
+              <a:buNone/>
+              <a:defRPr sz="1006"/>
             </a:lvl8pPr>
-            <a:lvl9pPr marL="3966667" indent="0">
-              <a:buNone/>
-              <a:defRPr sz="1085"/>
+            <a:lvl9pPr marL="3679180" indent="0">
+              <a:buNone/>
+              <a:defRPr sz="1006"/>
             </a:lvl9pPr>
           </a:lstStyle>
           <a:p>
@@ -2353,7 +2353,7 @@
           <a:p>
             <a:fld id="{BEB28509-2F36-408F-997B-EE4701DD66B7}" type="datetimeFigureOut">
               <a:rPr lang="en-GB" smtClean="0"/>
-              <a:t>17/05/2017</a:t>
+              <a:t>19/05/2017</a:t>
             </a:fld>
             <a:endParaRPr lang="en-GB"/>
           </a:p>
@@ -2404,7 +2404,7 @@
     </p:spTree>
     <p:extLst>
       <p:ext uri="{BB962C8B-B14F-4D97-AF65-F5344CB8AC3E}">
-        <p14:creationId xmlns:p14="http://schemas.microsoft.com/office/powerpoint/2010/main" val="3531080738"/>
+        <p14:creationId xmlns:p14="http://schemas.microsoft.com/office/powerpoint/2010/main" val="3485676936"/>
       </p:ext>
     </p:extLst>
   </p:cSld>
@@ -2448,8 +2448,8 @@
         </p:nvSpPr>
         <p:spPr>
           <a:xfrm>
-            <a:off x="681802" y="649114"/>
-            <a:ext cx="8553510" cy="2356556"/>
+            <a:off x="632361" y="572454"/>
+            <a:ext cx="7933253" cy="2078250"/>
           </a:xfrm>
           <a:prstGeom prst="rect">
             <a:avLst/>
@@ -2481,8 +2481,8 @@
         </p:nvSpPr>
         <p:spPr>
           <a:xfrm>
-            <a:off x="681802" y="3245556"/>
-            <a:ext cx="8553510" cy="7735712"/>
+            <a:off x="632361" y="2862259"/>
+            <a:ext cx="7933253" cy="6822133"/>
           </a:xfrm>
           <a:prstGeom prst="rect">
             <a:avLst/>
@@ -2543,8 +2543,8 @@
         </p:nvSpPr>
         <p:spPr>
           <a:xfrm>
-            <a:off x="681802" y="11300181"/>
-            <a:ext cx="2231350" cy="649111"/>
+            <a:off x="632361" y="9965641"/>
+            <a:ext cx="2069544" cy="572452"/>
           </a:xfrm>
           <a:prstGeom prst="rect">
             <a:avLst/>
@@ -2554,7 +2554,7 @@
           <a:bodyPr vert="horz" lIns="91440" tIns="45720" rIns="91440" bIns="45720" rtlCol="0" anchor="ctr"/>
           <a:lstStyle>
             <a:lvl1pPr algn="l">
-              <a:defRPr sz="1301">
+              <a:defRPr sz="1207">
                 <a:solidFill>
                   <a:schemeClr val="tx1">
                     <a:tint val="75000"/>
@@ -2566,7 +2566,7 @@
           <a:p>
             <a:fld id="{BEB28509-2F36-408F-997B-EE4701DD66B7}" type="datetimeFigureOut">
               <a:rPr lang="en-GB" smtClean="0"/>
-              <a:t>17/05/2017</a:t>
+              <a:t>19/05/2017</a:t>
             </a:fld>
             <a:endParaRPr lang="en-GB"/>
           </a:p>
@@ -2584,8 +2584,8 @@
         </p:nvSpPr>
         <p:spPr>
           <a:xfrm>
-            <a:off x="3285044" y="11300181"/>
-            <a:ext cx="3347026" cy="649111"/>
+            <a:off x="3046829" y="9965641"/>
+            <a:ext cx="3104317" cy="572452"/>
           </a:xfrm>
           <a:prstGeom prst="rect">
             <a:avLst/>
@@ -2595,7 +2595,7 @@
           <a:bodyPr vert="horz" lIns="91440" tIns="45720" rIns="91440" bIns="45720" rtlCol="0" anchor="ctr"/>
           <a:lstStyle>
             <a:lvl1pPr algn="ctr">
-              <a:defRPr sz="1301">
+              <a:defRPr sz="1207">
                 <a:solidFill>
                   <a:schemeClr val="tx1">
                     <a:tint val="75000"/>
@@ -2621,8 +2621,8 @@
         </p:nvSpPr>
         <p:spPr>
           <a:xfrm>
-            <a:off x="7003961" y="11300181"/>
-            <a:ext cx="2231350" cy="649111"/>
+            <a:off x="6496070" y="9965641"/>
+            <a:ext cx="2069544" cy="572452"/>
           </a:xfrm>
           <a:prstGeom prst="rect">
             <a:avLst/>
@@ -2632,7 +2632,7 @@
           <a:bodyPr vert="horz" lIns="91440" tIns="45720" rIns="91440" bIns="45720" rtlCol="0" anchor="ctr"/>
           <a:lstStyle>
             <a:lvl1pPr algn="r">
-              <a:defRPr sz="1301">
+              <a:defRPr sz="1207">
                 <a:solidFill>
                   <a:schemeClr val="tx1">
                     <a:tint val="75000"/>
@@ -2653,27 +2653,27 @@
     </p:spTree>
     <p:extLst>
       <p:ext uri="{BB962C8B-B14F-4D97-AF65-F5344CB8AC3E}">
-        <p14:creationId xmlns:p14="http://schemas.microsoft.com/office/powerpoint/2010/main" val="3176697716"/>
+        <p14:creationId xmlns:p14="http://schemas.microsoft.com/office/powerpoint/2010/main" val="2942946553"/>
       </p:ext>
     </p:extLst>
   </p:cSld>
   <p:clrMap bg1="lt1" tx1="dk1" bg2="lt2" tx2="dk2" accent1="accent1" accent2="accent2" accent3="accent3" accent4="accent4" accent5="accent5" accent6="accent6" hlink="hlink" folHlink="folHlink"/>
   <p:sldLayoutIdLst>
-    <p:sldLayoutId id="2147483721" r:id="rId1"/>
-    <p:sldLayoutId id="2147483722" r:id="rId2"/>
-    <p:sldLayoutId id="2147483723" r:id="rId3"/>
-    <p:sldLayoutId id="2147483724" r:id="rId4"/>
-    <p:sldLayoutId id="2147483725" r:id="rId5"/>
-    <p:sldLayoutId id="2147483726" r:id="rId6"/>
-    <p:sldLayoutId id="2147483727" r:id="rId7"/>
-    <p:sldLayoutId id="2147483728" r:id="rId8"/>
-    <p:sldLayoutId id="2147483729" r:id="rId9"/>
-    <p:sldLayoutId id="2147483730" r:id="rId10"/>
-    <p:sldLayoutId id="2147483731" r:id="rId11"/>
+    <p:sldLayoutId id="2147483757" r:id="rId1"/>
+    <p:sldLayoutId id="2147483758" r:id="rId2"/>
+    <p:sldLayoutId id="2147483759" r:id="rId3"/>
+    <p:sldLayoutId id="2147483760" r:id="rId4"/>
+    <p:sldLayoutId id="2147483761" r:id="rId5"/>
+    <p:sldLayoutId id="2147483762" r:id="rId6"/>
+    <p:sldLayoutId id="2147483763" r:id="rId7"/>
+    <p:sldLayoutId id="2147483764" r:id="rId8"/>
+    <p:sldLayoutId id="2147483765" r:id="rId9"/>
+    <p:sldLayoutId id="2147483766" r:id="rId10"/>
+    <p:sldLayoutId id="2147483767" r:id="rId11"/>
   </p:sldLayoutIdLst>
   <p:txStyles>
     <p:titleStyle>
-      <a:lvl1pPr algn="l" defTabSz="991667" rtl="0" eaLnBrk="1" latinLnBrk="0" hangingPunct="1">
+      <a:lvl1pPr algn="l" defTabSz="919795" rtl="0" eaLnBrk="1" latinLnBrk="0" hangingPunct="1">
         <a:lnSpc>
           <a:spcPct val="90000"/>
         </a:lnSpc>
@@ -2681,7 +2681,7 @@
           <a:spcPct val="0"/>
         </a:spcBef>
         <a:buNone/>
-        <a:defRPr sz="4772" kern="1200">
+        <a:defRPr sz="4426" kern="1200">
           <a:solidFill>
             <a:schemeClr val="tx1"/>
           </a:solidFill>
@@ -2692,16 +2692,16 @@
       </a:lvl1pPr>
     </p:titleStyle>
     <p:bodyStyle>
-      <a:lvl1pPr marL="247917" indent="-247917" algn="l" defTabSz="991667" rtl="0" eaLnBrk="1" latinLnBrk="0" hangingPunct="1">
+      <a:lvl1pPr marL="229949" indent="-229949" algn="l" defTabSz="919795" rtl="0" eaLnBrk="1" latinLnBrk="0" hangingPunct="1">
         <a:lnSpc>
           <a:spcPct val="90000"/>
         </a:lnSpc>
         <a:spcBef>
-          <a:spcPts val="1085"/>
+          <a:spcPts val="1006"/>
         </a:spcBef>
         <a:buFont typeface="Arial" panose="020B0604020202020204" pitchFamily="34" charset="0"/>
         <a:buChar char="•"/>
-        <a:defRPr sz="3037" kern="1200">
+        <a:defRPr sz="2817" kern="1200">
           <a:solidFill>
             <a:schemeClr val="tx1"/>
           </a:solidFill>
@@ -2710,16 +2710,16 @@
           <a:cs typeface="+mn-cs"/>
         </a:defRPr>
       </a:lvl1pPr>
-      <a:lvl2pPr marL="743750" indent="-247917" algn="l" defTabSz="991667" rtl="0" eaLnBrk="1" latinLnBrk="0" hangingPunct="1">
+      <a:lvl2pPr marL="689846" indent="-229949" algn="l" defTabSz="919795" rtl="0" eaLnBrk="1" latinLnBrk="0" hangingPunct="1">
         <a:lnSpc>
           <a:spcPct val="90000"/>
         </a:lnSpc>
         <a:spcBef>
-          <a:spcPts val="542"/>
+          <a:spcPts val="503"/>
         </a:spcBef>
         <a:buFont typeface="Arial" panose="020B0604020202020204" pitchFamily="34" charset="0"/>
         <a:buChar char="•"/>
-        <a:defRPr sz="2603" kern="1200">
+        <a:defRPr sz="2414" kern="1200">
           <a:solidFill>
             <a:schemeClr val="tx1"/>
           </a:solidFill>
@@ -2728,16 +2728,16 @@
           <a:cs typeface="+mn-cs"/>
         </a:defRPr>
       </a:lvl2pPr>
-      <a:lvl3pPr marL="1239584" indent="-247917" algn="l" defTabSz="991667" rtl="0" eaLnBrk="1" latinLnBrk="0" hangingPunct="1">
+      <a:lvl3pPr marL="1149744" indent="-229949" algn="l" defTabSz="919795" rtl="0" eaLnBrk="1" latinLnBrk="0" hangingPunct="1">
         <a:lnSpc>
           <a:spcPct val="90000"/>
         </a:lnSpc>
         <a:spcBef>
-          <a:spcPts val="542"/>
+          <a:spcPts val="503"/>
         </a:spcBef>
         <a:buFont typeface="Arial" panose="020B0604020202020204" pitchFamily="34" charset="0"/>
         <a:buChar char="•"/>
-        <a:defRPr sz="2169" kern="1200">
+        <a:defRPr sz="2012" kern="1200">
           <a:solidFill>
             <a:schemeClr val="tx1"/>
           </a:solidFill>
@@ -2746,16 +2746,16 @@
           <a:cs typeface="+mn-cs"/>
         </a:defRPr>
       </a:lvl3pPr>
-      <a:lvl4pPr marL="1735417" indent="-247917" algn="l" defTabSz="991667" rtl="0" eaLnBrk="1" latinLnBrk="0" hangingPunct="1">
+      <a:lvl4pPr marL="1609641" indent="-229949" algn="l" defTabSz="919795" rtl="0" eaLnBrk="1" latinLnBrk="0" hangingPunct="1">
         <a:lnSpc>
           <a:spcPct val="90000"/>
         </a:lnSpc>
         <a:spcBef>
-          <a:spcPts val="542"/>
+          <a:spcPts val="503"/>
         </a:spcBef>
         <a:buFont typeface="Arial" panose="020B0604020202020204" pitchFamily="34" charset="0"/>
         <a:buChar char="•"/>
-        <a:defRPr sz="1952" kern="1200">
+        <a:defRPr sz="1811" kern="1200">
           <a:solidFill>
             <a:schemeClr val="tx1"/>
           </a:solidFill>
@@ -2764,16 +2764,16 @@
           <a:cs typeface="+mn-cs"/>
         </a:defRPr>
       </a:lvl4pPr>
-      <a:lvl5pPr marL="2231250" indent="-247917" algn="l" defTabSz="991667" rtl="0" eaLnBrk="1" latinLnBrk="0" hangingPunct="1">
+      <a:lvl5pPr marL="2069539" indent="-229949" algn="l" defTabSz="919795" rtl="0" eaLnBrk="1" latinLnBrk="0" hangingPunct="1">
         <a:lnSpc>
           <a:spcPct val="90000"/>
         </a:lnSpc>
         <a:spcBef>
-          <a:spcPts val="542"/>
+          <a:spcPts val="503"/>
         </a:spcBef>
         <a:buFont typeface="Arial" panose="020B0604020202020204" pitchFamily="34" charset="0"/>
         <a:buChar char="•"/>
-        <a:defRPr sz="1952" kern="1200">
+        <a:defRPr sz="1811" kern="1200">
           <a:solidFill>
             <a:schemeClr val="tx1"/>
           </a:solidFill>
@@ -2782,16 +2782,16 @@
           <a:cs typeface="+mn-cs"/>
         </a:defRPr>
       </a:lvl5pPr>
-      <a:lvl6pPr marL="2727084" indent="-247917" algn="l" defTabSz="991667" rtl="0" eaLnBrk="1" latinLnBrk="0" hangingPunct="1">
+      <a:lvl6pPr marL="2529436" indent="-229949" algn="l" defTabSz="919795" rtl="0" eaLnBrk="1" latinLnBrk="0" hangingPunct="1">
         <a:lnSpc>
           <a:spcPct val="90000"/>
         </a:lnSpc>
         <a:spcBef>
-          <a:spcPts val="542"/>
+          <a:spcPts val="503"/>
         </a:spcBef>
         <a:buFont typeface="Arial" panose="020B0604020202020204" pitchFamily="34" charset="0"/>
         <a:buChar char="•"/>
-        <a:defRPr sz="1952" kern="1200">
+        <a:defRPr sz="1811" kern="1200">
           <a:solidFill>
             <a:schemeClr val="tx1"/>
           </a:solidFill>
@@ -2800,16 +2800,16 @@
           <a:cs typeface="+mn-cs"/>
         </a:defRPr>
       </a:lvl6pPr>
-      <a:lvl7pPr marL="3222917" indent="-247917" algn="l" defTabSz="991667" rtl="0" eaLnBrk="1" latinLnBrk="0" hangingPunct="1">
+      <a:lvl7pPr marL="2989334" indent="-229949" algn="l" defTabSz="919795" rtl="0" eaLnBrk="1" latinLnBrk="0" hangingPunct="1">
         <a:lnSpc>
           <a:spcPct val="90000"/>
         </a:lnSpc>
         <a:spcBef>
-          <a:spcPts val="542"/>
+          <a:spcPts val="503"/>
         </a:spcBef>
         <a:buFont typeface="Arial" panose="020B0604020202020204" pitchFamily="34" charset="0"/>
         <a:buChar char="•"/>
-        <a:defRPr sz="1952" kern="1200">
+        <a:defRPr sz="1811" kern="1200">
           <a:solidFill>
             <a:schemeClr val="tx1"/>
           </a:solidFill>
@@ -2818,16 +2818,16 @@
           <a:cs typeface="+mn-cs"/>
         </a:defRPr>
       </a:lvl7pPr>
-      <a:lvl8pPr marL="3718751" indent="-247917" algn="l" defTabSz="991667" rtl="0" eaLnBrk="1" latinLnBrk="0" hangingPunct="1">
+      <a:lvl8pPr marL="3449231" indent="-229949" algn="l" defTabSz="919795" rtl="0" eaLnBrk="1" latinLnBrk="0" hangingPunct="1">
         <a:lnSpc>
           <a:spcPct val="90000"/>
         </a:lnSpc>
         <a:spcBef>
-          <a:spcPts val="542"/>
+          <a:spcPts val="503"/>
         </a:spcBef>
         <a:buFont typeface="Arial" panose="020B0604020202020204" pitchFamily="34" charset="0"/>
         <a:buChar char="•"/>
-        <a:defRPr sz="1952" kern="1200">
+        <a:defRPr sz="1811" kern="1200">
           <a:solidFill>
             <a:schemeClr val="tx1"/>
           </a:solidFill>
@@ -2836,16 +2836,16 @@
           <a:cs typeface="+mn-cs"/>
         </a:defRPr>
       </a:lvl8pPr>
-      <a:lvl9pPr marL="4214584" indent="-247917" algn="l" defTabSz="991667" rtl="0" eaLnBrk="1" latinLnBrk="0" hangingPunct="1">
+      <a:lvl9pPr marL="3909129" indent="-229949" algn="l" defTabSz="919795" rtl="0" eaLnBrk="1" latinLnBrk="0" hangingPunct="1">
         <a:lnSpc>
           <a:spcPct val="90000"/>
         </a:lnSpc>
         <a:spcBef>
-          <a:spcPts val="542"/>
+          <a:spcPts val="503"/>
         </a:spcBef>
         <a:buFont typeface="Arial" panose="020B0604020202020204" pitchFamily="34" charset="0"/>
         <a:buChar char="•"/>
-        <a:defRPr sz="1952" kern="1200">
+        <a:defRPr sz="1811" kern="1200">
           <a:solidFill>
             <a:schemeClr val="tx1"/>
           </a:solidFill>
@@ -2859,8 +2859,8 @@
       <a:defPPr>
         <a:defRPr lang="en-US"/>
       </a:defPPr>
-      <a:lvl1pPr marL="0" algn="l" defTabSz="991667" rtl="0" eaLnBrk="1" latinLnBrk="0" hangingPunct="1">
-        <a:defRPr sz="1952" kern="1200">
+      <a:lvl1pPr marL="0" algn="l" defTabSz="919795" rtl="0" eaLnBrk="1" latinLnBrk="0" hangingPunct="1">
+        <a:defRPr sz="1811" kern="1200">
           <a:solidFill>
             <a:schemeClr val="tx1"/>
           </a:solidFill>
@@ -2869,8 +2869,8 @@
           <a:cs typeface="+mn-cs"/>
         </a:defRPr>
       </a:lvl1pPr>
-      <a:lvl2pPr marL="495833" algn="l" defTabSz="991667" rtl="0" eaLnBrk="1" latinLnBrk="0" hangingPunct="1">
-        <a:defRPr sz="1952" kern="1200">
+      <a:lvl2pPr marL="459897" algn="l" defTabSz="919795" rtl="0" eaLnBrk="1" latinLnBrk="0" hangingPunct="1">
+        <a:defRPr sz="1811" kern="1200">
           <a:solidFill>
             <a:schemeClr val="tx1"/>
           </a:solidFill>
@@ -2879,8 +2879,8 @@
           <a:cs typeface="+mn-cs"/>
         </a:defRPr>
       </a:lvl2pPr>
-      <a:lvl3pPr marL="991667" algn="l" defTabSz="991667" rtl="0" eaLnBrk="1" latinLnBrk="0" hangingPunct="1">
-        <a:defRPr sz="1952" kern="1200">
+      <a:lvl3pPr marL="919795" algn="l" defTabSz="919795" rtl="0" eaLnBrk="1" latinLnBrk="0" hangingPunct="1">
+        <a:defRPr sz="1811" kern="1200">
           <a:solidFill>
             <a:schemeClr val="tx1"/>
           </a:solidFill>
@@ -2889,8 +2889,8 @@
           <a:cs typeface="+mn-cs"/>
         </a:defRPr>
       </a:lvl3pPr>
-      <a:lvl4pPr marL="1487500" algn="l" defTabSz="991667" rtl="0" eaLnBrk="1" latinLnBrk="0" hangingPunct="1">
-        <a:defRPr sz="1952" kern="1200">
+      <a:lvl4pPr marL="1379692" algn="l" defTabSz="919795" rtl="0" eaLnBrk="1" latinLnBrk="0" hangingPunct="1">
+        <a:defRPr sz="1811" kern="1200">
           <a:solidFill>
             <a:schemeClr val="tx1"/>
           </a:solidFill>
@@ -2899,8 +2899,8 @@
           <a:cs typeface="+mn-cs"/>
         </a:defRPr>
       </a:lvl4pPr>
-      <a:lvl5pPr marL="1983334" algn="l" defTabSz="991667" rtl="0" eaLnBrk="1" latinLnBrk="0" hangingPunct="1">
-        <a:defRPr sz="1952" kern="1200">
+      <a:lvl5pPr marL="1839590" algn="l" defTabSz="919795" rtl="0" eaLnBrk="1" latinLnBrk="0" hangingPunct="1">
+        <a:defRPr sz="1811" kern="1200">
           <a:solidFill>
             <a:schemeClr val="tx1"/>
           </a:solidFill>
@@ -2909,8 +2909,8 @@
           <a:cs typeface="+mn-cs"/>
         </a:defRPr>
       </a:lvl5pPr>
-      <a:lvl6pPr marL="2479167" algn="l" defTabSz="991667" rtl="0" eaLnBrk="1" latinLnBrk="0" hangingPunct="1">
-        <a:defRPr sz="1952" kern="1200">
+      <a:lvl6pPr marL="2299487" algn="l" defTabSz="919795" rtl="0" eaLnBrk="1" latinLnBrk="0" hangingPunct="1">
+        <a:defRPr sz="1811" kern="1200">
           <a:solidFill>
             <a:schemeClr val="tx1"/>
           </a:solidFill>
@@ -2919,8 +2919,8 @@
           <a:cs typeface="+mn-cs"/>
         </a:defRPr>
       </a:lvl6pPr>
-      <a:lvl7pPr marL="2975000" algn="l" defTabSz="991667" rtl="0" eaLnBrk="1" latinLnBrk="0" hangingPunct="1">
-        <a:defRPr sz="1952" kern="1200">
+      <a:lvl7pPr marL="2759385" algn="l" defTabSz="919795" rtl="0" eaLnBrk="1" latinLnBrk="0" hangingPunct="1">
+        <a:defRPr sz="1811" kern="1200">
           <a:solidFill>
             <a:schemeClr val="tx1"/>
           </a:solidFill>
@@ -2929,8 +2929,8 @@
           <a:cs typeface="+mn-cs"/>
         </a:defRPr>
       </a:lvl7pPr>
-      <a:lvl8pPr marL="3470834" algn="l" defTabSz="991667" rtl="0" eaLnBrk="1" latinLnBrk="0" hangingPunct="1">
-        <a:defRPr sz="1952" kern="1200">
+      <a:lvl8pPr marL="3219282" algn="l" defTabSz="919795" rtl="0" eaLnBrk="1" latinLnBrk="0" hangingPunct="1">
+        <a:defRPr sz="1811" kern="1200">
           <a:solidFill>
             <a:schemeClr val="tx1"/>
           </a:solidFill>
@@ -2939,8 +2939,8 @@
           <a:cs typeface="+mn-cs"/>
         </a:defRPr>
       </a:lvl8pPr>
-      <a:lvl9pPr marL="3966667" algn="l" defTabSz="991667" rtl="0" eaLnBrk="1" latinLnBrk="0" hangingPunct="1">
-        <a:defRPr sz="1952" kern="1200">
+      <a:lvl9pPr marL="3679180" algn="l" defTabSz="919795" rtl="0" eaLnBrk="1" latinLnBrk="0" hangingPunct="1">
+        <a:defRPr sz="1811" kern="1200">
           <a:solidFill>
             <a:schemeClr val="tx1"/>
           </a:solidFill>
@@ -2987,7 +2987,7 @@
         </p:nvGrpSpPr>
         <p:grpSpPr>
           <a:xfrm>
-            <a:off x="1962788" y="226325"/>
+            <a:off x="1422469" y="390558"/>
             <a:ext cx="1054992" cy="677080"/>
             <a:chOff x="1364566" y="393895"/>
             <a:chExt cx="1012874" cy="393896"/>
@@ -3031,7 +3031,7 @@
             </a:fontRef>
           </p:style>
           <p:txBody>
-            <a:bodyPr rot="0" spcFirstLastPara="0" vertOverflow="overflow" horzOverflow="overflow" vert="horz" wrap="square" lIns="51435" tIns="25718" rIns="51435" bIns="25718" numCol="1" spcCol="0" rtlCol="0" fromWordArt="0" anchor="ctr" anchorCtr="0" forceAA="0" compatLnSpc="1">
+            <a:bodyPr rot="0" spcFirstLastPara="0" vertOverflow="overflow" horzOverflow="overflow" vert="horz" wrap="square" lIns="51435" tIns="25719" rIns="51435" bIns="25719" numCol="1" spcCol="0" rtlCol="0" fromWordArt="0" anchor="ctr" anchorCtr="0" forceAA="0" compatLnSpc="1">
               <a:prstTxWarp prst="textNoShape">
                 <a:avLst/>
               </a:prstTxWarp>
@@ -3040,7 +3040,7 @@
             <a:lstStyle/>
             <a:p>
               <a:pPr algn="ctr"/>
-              <a:endParaRPr lang="en-GB" sz="1013"/>
+              <a:endParaRPr lang="en-GB" sz="1012"/>
             </a:p>
           </p:txBody>
         </p:sp>
@@ -3083,7 +3083,7 @@
         </p:nvSpPr>
         <p:spPr>
           <a:xfrm>
-            <a:off x="3735248" y="422012"/>
+            <a:off x="3194930" y="586246"/>
             <a:ext cx="882732" cy="276999"/>
           </a:xfrm>
           <a:prstGeom prst="rect">
@@ -3123,8 +3123,8 @@
         </p:nvCxnSpPr>
         <p:spPr>
           <a:xfrm flipV="1">
-            <a:off x="3017780" y="560505"/>
-            <a:ext cx="717468" cy="4360"/>
+            <a:off x="2477464" y="724744"/>
+            <a:ext cx="717469" cy="4354"/>
           </a:xfrm>
           <a:prstGeom prst="straightConnector1">
             <a:avLst/>
@@ -3159,8 +3159,8 @@
         </p:nvCxnSpPr>
         <p:spPr>
           <a:xfrm>
-            <a:off x="4176614" y="699011"/>
-            <a:ext cx="0" cy="1265967"/>
+            <a:off x="3636296" y="863243"/>
+            <a:ext cx="0" cy="1265968"/>
           </a:xfrm>
           <a:prstGeom prst="straightConnector1">
             <a:avLst/>
@@ -3192,7 +3192,7 @@
         </p:nvSpPr>
         <p:spPr>
           <a:xfrm>
-            <a:off x="2966313" y="1807755"/>
+            <a:off x="2425993" y="1971990"/>
             <a:ext cx="698500" cy="276999"/>
           </a:xfrm>
           <a:prstGeom prst="rect">
@@ -3222,7 +3222,7 @@
         </p:nvSpPr>
         <p:spPr>
           <a:xfrm>
-            <a:off x="1896486" y="2051436"/>
+            <a:off x="1356166" y="2215672"/>
             <a:ext cx="1050966" cy="276999"/>
           </a:xfrm>
           <a:prstGeom prst="rect">
@@ -3258,7 +3258,7 @@
         </p:nvSpPr>
         <p:spPr>
           <a:xfrm>
-            <a:off x="3677701" y="1955351"/>
+            <a:off x="3137381" y="2119587"/>
             <a:ext cx="1050966" cy="461665"/>
           </a:xfrm>
           <a:prstGeom prst="rect">
@@ -3293,7 +3293,7 @@
         </p:nvSpPr>
         <p:spPr>
           <a:xfrm>
-            <a:off x="4205314" y="1090026"/>
+            <a:off x="3664994" y="1254263"/>
             <a:ext cx="698500" cy="461665"/>
           </a:xfrm>
           <a:prstGeom prst="rect">
@@ -3323,7 +3323,7 @@
         </p:nvSpPr>
         <p:spPr>
           <a:xfrm>
-            <a:off x="6567348" y="422012"/>
+            <a:off x="6027028" y="586246"/>
             <a:ext cx="882732" cy="276999"/>
           </a:xfrm>
           <a:prstGeom prst="rect">
@@ -3364,8 +3364,8 @@
         </p:nvCxnSpPr>
         <p:spPr>
           <a:xfrm>
-            <a:off x="4203185" y="2417016"/>
-            <a:ext cx="13285" cy="1995763"/>
+            <a:off x="3662867" y="2581252"/>
+            <a:ext cx="13287" cy="1995763"/>
           </a:xfrm>
           <a:prstGeom prst="straightConnector1">
             <a:avLst/>
@@ -3399,8 +3399,8 @@
         </p:nvCxnSpPr>
         <p:spPr>
           <a:xfrm>
-            <a:off x="7008714" y="699004"/>
-            <a:ext cx="0" cy="1127468"/>
+            <a:off x="6468394" y="863246"/>
+            <a:ext cx="0" cy="1127461"/>
           </a:xfrm>
           <a:prstGeom prst="straightConnector1">
             <a:avLst/>
@@ -3433,8 +3433,8 @@
         </p:nvSpPr>
         <p:spPr>
           <a:xfrm>
-            <a:off x="6945214" y="927604"/>
-            <a:ext cx="1311316" cy="457200"/>
+            <a:off x="6404895" y="1091842"/>
+            <a:ext cx="1311316" cy="461665"/>
           </a:xfrm>
           <a:prstGeom prst="rect">
             <a:avLst/>
@@ -3467,7 +3467,7 @@
         </p:nvSpPr>
         <p:spPr>
           <a:xfrm>
-            <a:off x="6491148" y="1826479"/>
+            <a:off x="5950828" y="1990715"/>
             <a:ext cx="1035132" cy="276999"/>
           </a:xfrm>
           <a:prstGeom prst="rect">
@@ -3504,7 +3504,7 @@
         </p:nvCxnSpPr>
         <p:spPr>
           <a:xfrm rot="5400000">
-            <a:off x="4778402" y="1568978"/>
+            <a:off x="4238083" y="1733210"/>
             <a:ext cx="1708234" cy="2832100"/>
           </a:xfrm>
           <a:prstGeom prst="curvedConnector2">
@@ -3534,7 +3534,7 @@
         </p:nvSpPr>
         <p:spPr>
           <a:xfrm>
-            <a:off x="4205314" y="2872852"/>
+            <a:off x="3664994" y="3037088"/>
             <a:ext cx="698500" cy="276999"/>
           </a:xfrm>
           <a:prstGeom prst="rect">
@@ -3565,7 +3565,7 @@
         </p:nvSpPr>
         <p:spPr>
           <a:xfrm>
-            <a:off x="3677701" y="4412779"/>
+            <a:off x="3137383" y="4577015"/>
             <a:ext cx="1077536" cy="276999"/>
           </a:xfrm>
           <a:prstGeom prst="rect">
@@ -3600,7 +3600,7 @@
         </p:nvSpPr>
         <p:spPr>
           <a:xfrm>
-            <a:off x="1880463" y="3775975"/>
+            <a:off x="1340148" y="3940211"/>
             <a:ext cx="1162861" cy="646331"/>
           </a:xfrm>
           <a:prstGeom prst="rect">
@@ -3635,7 +3635,7 @@
         </p:nvCxnSpPr>
         <p:spPr>
           <a:xfrm flipH="1">
-            <a:off x="3043325" y="4088710"/>
+            <a:off x="2503010" y="4252945"/>
             <a:ext cx="1159859" cy="10469"/>
           </a:xfrm>
           <a:prstGeom prst="straightConnector1">
@@ -3670,8 +3670,8 @@
         </p:nvCxnSpPr>
         <p:spPr>
           <a:xfrm rot="5400000">
-            <a:off x="2987509" y="3912856"/>
-            <a:ext cx="452038" cy="2005883"/>
+            <a:off x="2447196" y="4077094"/>
+            <a:ext cx="452039" cy="2005879"/>
           </a:xfrm>
           <a:prstGeom prst="bentConnector2">
             <a:avLst/>
@@ -3700,8 +3700,8 @@
         </p:nvCxnSpPr>
         <p:spPr>
           <a:xfrm>
-            <a:off x="2210586" y="5129811"/>
-            <a:ext cx="0" cy="660897"/>
+            <a:off x="1670266" y="5306054"/>
+            <a:ext cx="0" cy="648891"/>
           </a:xfrm>
           <a:prstGeom prst="straightConnector1">
             <a:avLst/>
@@ -3733,7 +3733,7 @@
         </p:nvSpPr>
         <p:spPr>
           <a:xfrm>
-            <a:off x="1685103" y="5790708"/>
+            <a:off x="1144783" y="5954944"/>
             <a:ext cx="1050966" cy="276999"/>
           </a:xfrm>
           <a:prstGeom prst="rect">
@@ -3770,7 +3770,7 @@
         </p:nvCxnSpPr>
         <p:spPr>
           <a:xfrm>
-            <a:off x="2210586" y="6067707"/>
+            <a:off x="1670266" y="6231943"/>
             <a:ext cx="0" cy="1252705"/>
           </a:xfrm>
           <a:prstGeom prst="straightConnector1">
@@ -3803,7 +3803,7 @@
         </p:nvSpPr>
         <p:spPr>
           <a:xfrm>
-            <a:off x="715253" y="6287433"/>
+            <a:off x="174934" y="6451669"/>
             <a:ext cx="882732" cy="276999"/>
           </a:xfrm>
           <a:prstGeom prst="rect">
@@ -3843,8 +3843,8 @@
         </p:nvCxnSpPr>
         <p:spPr>
           <a:xfrm rot="16200000" flipH="1">
-            <a:off x="1546919" y="6174138"/>
-            <a:ext cx="273383" cy="1053969"/>
+            <a:off x="1006604" y="6338366"/>
+            <a:ext cx="273377" cy="1053979"/>
           </a:xfrm>
           <a:prstGeom prst="curvedConnector2">
             <a:avLst/>
@@ -3873,7 +3873,7 @@
         </p:nvSpPr>
         <p:spPr>
           <a:xfrm>
-            <a:off x="2220069" y="6546664"/>
+            <a:off x="1679750" y="6710901"/>
             <a:ext cx="892216" cy="461665"/>
           </a:xfrm>
           <a:prstGeom prst="rect">
@@ -3907,7 +3907,7 @@
         </p:nvSpPr>
         <p:spPr>
           <a:xfrm>
-            <a:off x="1548307" y="7320412"/>
+            <a:off x="1007988" y="7484648"/>
             <a:ext cx="1324558" cy="461665"/>
           </a:xfrm>
           <a:prstGeom prst="rect">
@@ -3944,8 +3944,8 @@
         </p:nvCxnSpPr>
         <p:spPr>
           <a:xfrm>
-            <a:off x="2210593" y="7782077"/>
-            <a:ext cx="18967" cy="744835"/>
+            <a:off x="1670267" y="7946313"/>
+            <a:ext cx="18974" cy="744833"/>
           </a:xfrm>
           <a:prstGeom prst="straightConnector1">
             <a:avLst/>
@@ -3977,7 +3977,7 @@
         </p:nvSpPr>
         <p:spPr>
           <a:xfrm>
-            <a:off x="1594588" y="8571718"/>
+            <a:off x="1054273" y="8735954"/>
             <a:ext cx="1162861" cy="276999"/>
           </a:xfrm>
           <a:prstGeom prst="rect">
@@ -4013,8 +4013,8 @@
         </p:nvSpPr>
         <p:spPr>
           <a:xfrm>
-            <a:off x="2142997" y="7863956"/>
-            <a:ext cx="1220267" cy="276999"/>
+            <a:off x="1625318" y="8015849"/>
+            <a:ext cx="1308191" cy="276999"/>
           </a:xfrm>
           <a:prstGeom prst="rect">
             <a:avLst/>
@@ -4030,7 +4030,7 @@
             <a:pPr algn="ctr"/>
             <a:r>
               <a:rPr lang="en-GB" sz="1200" dirty="0" err="1"/>
-              <a:t>CoverageParser</a:t>
+              <a:t>coverage_parser</a:t>
             </a:r>
             <a:endParaRPr lang="en-GB" sz="1200" dirty="0"/>
           </a:p>
@@ -4043,9 +4043,9 @@
           <p:nvPr/>
         </p:nvCxnSpPr>
         <p:spPr>
-          <a:xfrm>
-            <a:off x="4216468" y="5144730"/>
-            <a:ext cx="1736379" cy="2"/>
+          <a:xfrm flipV="1">
+            <a:off x="3677227" y="5303678"/>
+            <a:ext cx="2395218" cy="1584"/>
           </a:xfrm>
           <a:prstGeom prst="line">
             <a:avLst/>
@@ -4076,8 +4076,8 @@
         </p:nvCxnSpPr>
         <p:spPr>
           <a:xfrm>
-            <a:off x="5952844" y="5133432"/>
-            <a:ext cx="0" cy="642493"/>
+            <a:off x="6071367" y="5303678"/>
+            <a:ext cx="0" cy="608207"/>
           </a:xfrm>
           <a:prstGeom prst="straightConnector1">
             <a:avLst/>
@@ -4109,7 +4109,7 @@
         </p:nvSpPr>
         <p:spPr>
           <a:xfrm>
-            <a:off x="5376643" y="5775925"/>
+            <a:off x="5495166" y="5911885"/>
             <a:ext cx="1152402" cy="461665"/>
           </a:xfrm>
           <a:prstGeom prst="rect">
@@ -4155,7 +4155,7 @@
         </p:nvSpPr>
         <p:spPr>
           <a:xfrm>
-            <a:off x="2278745" y="5282877"/>
+            <a:off x="1754463" y="5460128"/>
             <a:ext cx="793832" cy="276999"/>
           </a:xfrm>
           <a:prstGeom prst="rect">
@@ -4185,7 +4185,7 @@
         </p:nvSpPr>
         <p:spPr>
           <a:xfrm>
-            <a:off x="5995734" y="5198529"/>
+            <a:off x="6114258" y="5423028"/>
             <a:ext cx="1530546" cy="461665"/>
           </a:xfrm>
           <a:prstGeom prst="rect">
@@ -4213,18 +4213,21 @@
       </p:sp>
       <p:cxnSp>
         <p:nvCxnSpPr>
-          <p:cNvPr id="103" name="Elbow Connector 102"/>
+          <p:cNvPr id="127" name="Straight Arrow Connector 126"/>
           <p:cNvCxnSpPr/>
           <p:nvPr/>
         </p:nvCxnSpPr>
         <p:spPr>
-          <a:xfrm rot="5400000">
-            <a:off x="5257404" y="5850442"/>
-            <a:ext cx="309076" cy="1081803"/>
-          </a:xfrm>
-          <a:prstGeom prst="bentConnector2">
-            <a:avLst/>
-          </a:prstGeom>
+          <a:xfrm>
+            <a:off x="6071367" y="6373547"/>
+            <a:ext cx="0" cy="755978"/>
+          </a:xfrm>
+          <a:prstGeom prst="straightConnector1">
+            <a:avLst/>
+          </a:prstGeom>
+          <a:ln>
+            <a:tailEnd type="triangle"/>
+          </a:ln>
         </p:spPr>
         <p:style>
           <a:lnRef idx="1">
@@ -4241,49 +4244,16 @@
           </a:fontRef>
         </p:style>
       </p:cxnSp>
-      <p:cxnSp>
-        <p:nvCxnSpPr>
-          <p:cNvPr id="105" name="Straight Arrow Connector 104"/>
-          <p:cNvCxnSpPr/>
-          <p:nvPr/>
-        </p:nvCxnSpPr>
-        <p:spPr>
-          <a:xfrm>
-            <a:off x="4847208" y="6546664"/>
-            <a:ext cx="0" cy="773748"/>
-          </a:xfrm>
-          <a:prstGeom prst="straightConnector1">
-            <a:avLst/>
-          </a:prstGeom>
-          <a:ln>
-            <a:tailEnd type="triangle"/>
-          </a:ln>
-        </p:spPr>
-        <p:style>
-          <a:lnRef idx="1">
-            <a:schemeClr val="accent1"/>
-          </a:lnRef>
-          <a:fillRef idx="0">
-            <a:schemeClr val="accent1"/>
-          </a:fillRef>
-          <a:effectRef idx="0">
-            <a:schemeClr val="accent1"/>
-          </a:effectRef>
-          <a:fontRef idx="minor">
-            <a:schemeClr val="tx1"/>
-          </a:fontRef>
-        </p:style>
-      </p:cxnSp>
-      <p:sp>
-        <p:nvSpPr>
-          <p:cNvPr id="106" name="TextBox 105"/>
+      <p:sp>
+        <p:nvSpPr>
+          <p:cNvPr id="140" name="TextBox 139"/>
           <p:cNvSpPr txBox="1"/>
           <p:nvPr/>
         </p:nvSpPr>
         <p:spPr>
           <a:xfrm>
-            <a:off x="4118420" y="7309948"/>
-            <a:ext cx="1457576" cy="646331"/>
+            <a:off x="5564118" y="7139290"/>
+            <a:ext cx="1083452" cy="461665"/>
           </a:xfrm>
           <a:prstGeom prst="rect">
             <a:avLst/>
@@ -4304,32 +4274,26 @@
             <a:pPr algn="ctr"/>
             <a:r>
               <a:rPr lang="en-GB" sz="1200" dirty="0" err="1"/>
-              <a:t>CpG</a:t>
+              <a:t>Bedgraph</a:t>
             </a:r>
             <a:r>
               <a:rPr lang="en-GB" sz="1200" dirty="0"/>
-              <a:t> Sites </a:t>
-            </a:r>
-            <a:br>
-              <a:rPr lang="en-GB" sz="1200" dirty="0"/>
-            </a:br>
-            <a:r>
-              <a:rPr lang="en-GB" sz="1200" dirty="0"/>
-              <a:t>(split by strand and methylation status)</a:t>
-            </a:r>
-          </a:p>
-        </p:txBody>
-      </p:sp>
-      <p:sp>
-        <p:nvSpPr>
-          <p:cNvPr id="112" name="TextBox 111"/>
+              <a:t> Coverage</a:t>
+            </a:r>
+            <a:endParaRPr lang="en-GB" sz="1200" dirty="0"/>
+          </a:p>
+        </p:txBody>
+      </p:sp>
+      <p:sp>
+        <p:nvSpPr>
+          <p:cNvPr id="141" name="TextBox 140"/>
           <p:cNvSpPr txBox="1"/>
           <p:nvPr/>
         </p:nvSpPr>
         <p:spPr>
           <a:xfrm>
-            <a:off x="4904494" y="6717352"/>
-            <a:ext cx="1035829" cy="461665"/>
+            <a:off x="6114258" y="6561892"/>
+            <a:ext cx="1480854" cy="276999"/>
           </a:xfrm>
           <a:prstGeom prst="rect">
             <a:avLst/>
@@ -4345,361 +4309,11 @@
             <a:pPr algn="ctr"/>
             <a:r>
               <a:rPr lang="en-GB" sz="1200" dirty="0"/>
-              <a:t>MethUnmethCpGs2Bed</a:t>
-            </a:r>
-          </a:p>
-        </p:txBody>
-      </p:sp>
-      <p:cxnSp>
-        <p:nvCxnSpPr>
-          <p:cNvPr id="114" name="Straight Arrow Connector 113"/>
-          <p:cNvCxnSpPr>
-            <a:stCxn id="106" idx="2"/>
-          </p:cNvCxnSpPr>
-          <p:nvPr/>
-        </p:nvCxnSpPr>
-        <p:spPr>
-          <a:xfrm>
-            <a:off x="4847208" y="7956272"/>
-            <a:ext cx="0" cy="1129440"/>
-          </a:xfrm>
-          <a:prstGeom prst="straightConnector1">
-            <a:avLst/>
-          </a:prstGeom>
-          <a:ln>
-            <a:tailEnd type="triangle"/>
-          </a:ln>
-        </p:spPr>
-        <p:style>
-          <a:lnRef idx="1">
-            <a:schemeClr val="accent1"/>
-          </a:lnRef>
-          <a:fillRef idx="0">
-            <a:schemeClr val="accent1"/>
-          </a:fillRef>
-          <a:effectRef idx="0">
-            <a:schemeClr val="accent1"/>
-          </a:effectRef>
-          <a:fontRef idx="minor">
-            <a:schemeClr val="tx1"/>
-          </a:fontRef>
-        </p:style>
-      </p:cxnSp>
-      <p:sp>
-        <p:nvSpPr>
-          <p:cNvPr id="115" name="TextBox 114"/>
-          <p:cNvSpPr txBox="1"/>
-          <p:nvPr/>
-        </p:nvSpPr>
-        <p:spPr>
-          <a:xfrm>
-            <a:off x="4208762" y="9085719"/>
-            <a:ext cx="1324558" cy="1015663"/>
-          </a:xfrm>
-          <a:prstGeom prst="rect">
-            <a:avLst/>
-          </a:prstGeom>
-          <a:noFill/>
-          <a:ln>
-            <a:solidFill>
-              <a:schemeClr val="accent1"/>
-            </a:solidFill>
-          </a:ln>
-        </p:spPr>
-        <p:txBody>
-          <a:bodyPr wrap="square" rtlCol="0">
-            <a:spAutoFit/>
-          </a:bodyPr>
-          <a:lstStyle/>
-          <a:p>
-            <a:pPr algn="ctr"/>
-            <a:r>
-              <a:rPr lang="en-GB" sz="1200" dirty="0"/>
-              <a:t>BED Coverage </a:t>
-            </a:r>
-            <a:r>
-              <a:rPr lang="en-GB" sz="1200" dirty="0" smtClean="0"/>
-              <a:t>(separated by </a:t>
-            </a:r>
-            <a:r>
-              <a:rPr lang="en-GB" sz="1200" dirty="0"/>
-              <a:t>amplicon, strand and methylation status)</a:t>
-            </a:r>
-          </a:p>
-        </p:txBody>
-      </p:sp>
-      <p:sp>
-        <p:nvSpPr>
-          <p:cNvPr id="116" name="TextBox 115"/>
-          <p:cNvSpPr txBox="1"/>
-          <p:nvPr/>
-        </p:nvSpPr>
-        <p:spPr>
-          <a:xfrm>
-            <a:off x="4885336" y="8201636"/>
-            <a:ext cx="892216" cy="461665"/>
-          </a:xfrm>
-          <a:prstGeom prst="rect">
-            <a:avLst/>
-          </a:prstGeom>
-          <a:noFill/>
-        </p:spPr>
-        <p:txBody>
-          <a:bodyPr wrap="square" rtlCol="0">
-            <a:spAutoFit/>
-          </a:bodyPr>
-          <a:lstStyle/>
-          <a:p>
-            <a:pPr algn="ctr"/>
-            <a:r>
-              <a:rPr lang="en-GB" sz="1200" dirty="0" err="1"/>
-              <a:t>Bedtools</a:t>
-            </a:r>
-            <a:r>
-              <a:rPr lang="en-GB" sz="1200" dirty="0"/>
-              <a:t> Coverage</a:t>
-            </a:r>
-          </a:p>
-        </p:txBody>
-      </p:sp>
-      <p:sp>
-        <p:nvSpPr>
-          <p:cNvPr id="117" name="TextBox 116"/>
-          <p:cNvSpPr txBox="1"/>
-          <p:nvPr/>
-        </p:nvSpPr>
-        <p:spPr>
-          <a:xfrm>
-            <a:off x="3584260" y="8243749"/>
-            <a:ext cx="882732" cy="276999"/>
-          </a:xfrm>
-          <a:prstGeom prst="rect">
-            <a:avLst/>
-          </a:prstGeom>
-          <a:noFill/>
-          <a:ln cmpd="sng">
-            <a:solidFill>
-              <a:schemeClr val="accent1">
-                <a:shade val="50000"/>
-              </a:schemeClr>
-            </a:solidFill>
-            <a:prstDash val="solid"/>
-          </a:ln>
-        </p:spPr>
-        <p:txBody>
-          <a:bodyPr wrap="square" rtlCol="0">
-            <a:spAutoFit/>
-          </a:bodyPr>
-          <a:lstStyle/>
-          <a:p>
-            <a:pPr algn="ctr"/>
-            <a:r>
-              <a:rPr lang="en-GB" sz="1200" dirty="0"/>
-              <a:t>Amplicon</a:t>
-            </a:r>
-          </a:p>
-        </p:txBody>
-      </p:sp>
-      <p:cxnSp>
-        <p:nvCxnSpPr>
-          <p:cNvPr id="122" name="Curved Connector 121"/>
-          <p:cNvCxnSpPr>
-            <a:stCxn id="117" idx="2"/>
-          </p:cNvCxnSpPr>
-          <p:nvPr/>
-        </p:nvCxnSpPr>
-        <p:spPr>
-          <a:xfrm rot="16200000" flipH="1">
-            <a:off x="4272429" y="8273938"/>
-            <a:ext cx="327976" cy="821582"/>
-          </a:xfrm>
-          <a:prstGeom prst="curvedConnector2">
-            <a:avLst/>
-          </a:prstGeom>
-        </p:spPr>
-        <p:style>
-          <a:lnRef idx="1">
-            <a:schemeClr val="accent1"/>
-          </a:lnRef>
-          <a:fillRef idx="0">
-            <a:schemeClr val="accent1"/>
-          </a:fillRef>
-          <a:effectRef idx="0">
-            <a:schemeClr val="accent1"/>
-          </a:effectRef>
-          <a:fontRef idx="minor">
-            <a:schemeClr val="tx1"/>
-          </a:fontRef>
-        </p:style>
-      </p:cxnSp>
-      <p:cxnSp>
-        <p:nvCxnSpPr>
-          <p:cNvPr id="127" name="Straight Arrow Connector 126"/>
-          <p:cNvCxnSpPr/>
-          <p:nvPr/>
-        </p:nvCxnSpPr>
-        <p:spPr>
-          <a:xfrm>
-            <a:off x="7610128" y="6549672"/>
-            <a:ext cx="0" cy="755978"/>
-          </a:xfrm>
-          <a:prstGeom prst="straightConnector1">
-            <a:avLst/>
-          </a:prstGeom>
-          <a:ln>
-            <a:tailEnd type="triangle"/>
-          </a:ln>
-        </p:spPr>
-        <p:style>
-          <a:lnRef idx="1">
-            <a:schemeClr val="accent1"/>
-          </a:lnRef>
-          <a:fillRef idx="0">
-            <a:schemeClr val="accent1"/>
-          </a:fillRef>
-          <a:effectRef idx="0">
-            <a:schemeClr val="accent1"/>
-          </a:effectRef>
-          <a:fontRef idx="minor">
-            <a:schemeClr val="tx1"/>
-          </a:fontRef>
-        </p:style>
-      </p:cxnSp>
-      <p:cxnSp>
-        <p:nvCxnSpPr>
-          <p:cNvPr id="137" name="Straight Connector 136"/>
-          <p:cNvCxnSpPr/>
-          <p:nvPr/>
-        </p:nvCxnSpPr>
-        <p:spPr>
-          <a:xfrm>
-            <a:off x="5948618" y="6544833"/>
-            <a:ext cx="1665737" cy="14153"/>
-          </a:xfrm>
-          <a:prstGeom prst="line">
-            <a:avLst/>
-          </a:prstGeom>
-        </p:spPr>
-        <p:style>
-          <a:lnRef idx="1">
-            <a:schemeClr val="accent1"/>
-          </a:lnRef>
-          <a:fillRef idx="0">
-            <a:schemeClr val="accent1"/>
-          </a:fillRef>
-          <a:effectRef idx="0">
-            <a:schemeClr val="accent1"/>
-          </a:effectRef>
-          <a:fontRef idx="minor">
-            <a:schemeClr val="tx1"/>
-          </a:fontRef>
-        </p:style>
-      </p:cxnSp>
-      <p:sp>
-        <p:nvSpPr>
-          <p:cNvPr id="140" name="TextBox 139"/>
-          <p:cNvSpPr txBox="1"/>
-          <p:nvPr/>
-        </p:nvSpPr>
-        <p:spPr>
-          <a:xfrm>
-            <a:off x="7068402" y="7305630"/>
-            <a:ext cx="1083452" cy="461665"/>
-          </a:xfrm>
-          <a:prstGeom prst="rect">
-            <a:avLst/>
-          </a:prstGeom>
-          <a:noFill/>
-          <a:ln>
-            <a:solidFill>
-              <a:schemeClr val="accent1"/>
-            </a:solidFill>
-          </a:ln>
-        </p:spPr>
-        <p:txBody>
-          <a:bodyPr wrap="square" rtlCol="0">
-            <a:spAutoFit/>
-          </a:bodyPr>
-          <a:lstStyle/>
-          <a:p>
-            <a:pPr algn="ctr"/>
-            <a:r>
-              <a:rPr lang="en-GB" sz="1200" dirty="0" err="1" smtClean="0"/>
-              <a:t>Bedgraph</a:t>
-            </a:r>
-            <a:r>
-              <a:rPr lang="en-GB" sz="1200" dirty="0" smtClean="0"/>
-              <a:t> Coverage</a:t>
-            </a:r>
-            <a:endParaRPr lang="en-GB" sz="1200" dirty="0"/>
-          </a:p>
-        </p:txBody>
-      </p:sp>
-      <p:sp>
-        <p:nvSpPr>
-          <p:cNvPr id="141" name="TextBox 140"/>
-          <p:cNvSpPr txBox="1"/>
-          <p:nvPr/>
-        </p:nvSpPr>
-        <p:spPr>
-          <a:xfrm>
-            <a:off x="7497304" y="6685280"/>
-            <a:ext cx="1480855" cy="276999"/>
-          </a:xfrm>
-          <a:prstGeom prst="rect">
-            <a:avLst/>
-          </a:prstGeom>
-          <a:noFill/>
-        </p:spPr>
-        <p:txBody>
-          <a:bodyPr wrap="square" rtlCol="0">
-            <a:spAutoFit/>
-          </a:bodyPr>
-          <a:lstStyle/>
-          <a:p>
-            <a:pPr algn="ctr"/>
-            <a:r>
-              <a:rPr lang="en-GB" sz="1200" dirty="0"/>
               <a:t>Bismark2Bedgraph</a:t>
             </a:r>
           </a:p>
         </p:txBody>
       </p:sp>
-      <p:cxnSp>
-        <p:nvCxnSpPr>
-          <p:cNvPr id="143" name="Straight Arrow Connector 142"/>
-          <p:cNvCxnSpPr>
-            <a:stCxn id="140" idx="2"/>
-          </p:cNvCxnSpPr>
-          <p:nvPr/>
-        </p:nvCxnSpPr>
-        <p:spPr>
-          <a:xfrm>
-            <a:off x="7610128" y="7767295"/>
-            <a:ext cx="0" cy="1303659"/>
-          </a:xfrm>
-          <a:prstGeom prst="straightConnector1">
-            <a:avLst/>
-          </a:prstGeom>
-          <a:ln>
-            <a:tailEnd type="triangle"/>
-          </a:ln>
-        </p:spPr>
-        <p:style>
-          <a:lnRef idx="1">
-            <a:schemeClr val="accent1"/>
-          </a:lnRef>
-          <a:fillRef idx="0">
-            <a:schemeClr val="accent1"/>
-          </a:fillRef>
-          <a:effectRef idx="0">
-            <a:schemeClr val="accent1"/>
-          </a:effectRef>
-          <a:fontRef idx="minor">
-            <a:schemeClr val="tx1"/>
-          </a:fontRef>
-        </p:style>
-      </p:cxnSp>
       <p:sp>
         <p:nvSpPr>
           <p:cNvPr id="144" name="TextBox 143"/>
@@ -4708,7 +4322,7 @@
         </p:nvSpPr>
         <p:spPr>
           <a:xfrm>
-            <a:off x="6637590" y="9070930"/>
+            <a:off x="6426588" y="9554985"/>
             <a:ext cx="1945076" cy="276999"/>
           </a:xfrm>
           <a:prstGeom prst="rect">
@@ -4733,7 +4347,7 @@
             <a:pPr algn="ctr"/>
             <a:r>
               <a:rPr lang="en-GB" sz="1200" dirty="0" err="1"/>
-              <a:t>CpG_meth_percent_site.tsv</a:t>
+              <a:t>CpG_meth_percent.tsv</a:t>
             </a:r>
             <a:endParaRPr lang="en-GB" sz="1200" dirty="0"/>
           </a:p>
@@ -4747,7 +4361,7 @@
         </p:nvSpPr>
         <p:spPr>
           <a:xfrm>
-            <a:off x="8119645" y="8092449"/>
+            <a:off x="7975847" y="8656692"/>
             <a:ext cx="882732" cy="461665"/>
           </a:xfrm>
           <a:prstGeom prst="rect">
@@ -4784,15 +4398,13 @@
       <p:cxnSp>
         <p:nvCxnSpPr>
           <p:cNvPr id="148" name="Curved Connector 147"/>
-          <p:cNvCxnSpPr>
-            <a:stCxn id="146" idx="2"/>
-          </p:cNvCxnSpPr>
+          <p:cNvCxnSpPr/>
           <p:nvPr/>
         </p:nvCxnSpPr>
         <p:spPr>
           <a:xfrm rot="5400000">
-            <a:off x="7942665" y="8221584"/>
-            <a:ext cx="285821" cy="950881"/>
+            <a:off x="7666035" y="8802688"/>
+            <a:ext cx="285821" cy="950882"/>
           </a:xfrm>
           <a:prstGeom prst="curvedConnector2">
             <a:avLst/>
@@ -4816,41 +4428,6 @@
           </a:fontRef>
         </p:style>
       </p:cxnSp>
-      <p:cxnSp>
-        <p:nvCxnSpPr>
-          <p:cNvPr id="150" name="Straight Arrow Connector 149"/>
-          <p:cNvCxnSpPr>
-            <a:stCxn id="115" idx="2"/>
-          </p:cNvCxnSpPr>
-          <p:nvPr/>
-        </p:nvCxnSpPr>
-        <p:spPr>
-          <a:xfrm>
-            <a:off x="4871041" y="10101382"/>
-            <a:ext cx="0" cy="931063"/>
-          </a:xfrm>
-          <a:prstGeom prst="straightConnector1">
-            <a:avLst/>
-          </a:prstGeom>
-          <a:ln>
-            <a:tailEnd type="triangle"/>
-          </a:ln>
-        </p:spPr>
-        <p:style>
-          <a:lnRef idx="1">
-            <a:schemeClr val="accent1"/>
-          </a:lnRef>
-          <a:fillRef idx="0">
-            <a:schemeClr val="accent1"/>
-          </a:fillRef>
-          <a:effectRef idx="0">
-            <a:schemeClr val="accent1"/>
-          </a:effectRef>
-          <a:fontRef idx="minor">
-            <a:schemeClr val="tx1"/>
-          </a:fontRef>
-        </p:style>
-      </p:cxnSp>
       <p:sp>
         <p:nvSpPr>
           <p:cNvPr id="151" name="TextBox 150"/>
@@ -4859,7 +4436,7 @@
         </p:nvSpPr>
         <p:spPr>
           <a:xfrm>
-            <a:off x="3898503" y="11021847"/>
+            <a:off x="3610558" y="9534952"/>
             <a:ext cx="1945076" cy="276999"/>
           </a:xfrm>
           <a:prstGeom prst="rect">
@@ -4886,7 +4463,7 @@
             <a:pPr algn="ctr"/>
             <a:r>
               <a:rPr lang="en-GB" sz="1200" dirty="0" err="1"/>
-              <a:t>CpG_divided_coverage.tsv</a:t>
+              <a:t>CpG_amplicon_coverage.tsv</a:t>
             </a:r>
             <a:endParaRPr lang="en-GB" sz="1200" dirty="0"/>
           </a:p>
@@ -4894,14 +4471,14 @@
       </p:sp>
       <p:sp>
         <p:nvSpPr>
-          <p:cNvPr id="152" name="TextBox 151"/>
+          <p:cNvPr id="156" name="TextBox 155"/>
           <p:cNvSpPr txBox="1"/>
           <p:nvPr/>
         </p:nvSpPr>
         <p:spPr>
           <a:xfrm>
-            <a:off x="4685277" y="10191436"/>
-            <a:ext cx="1781438" cy="461665"/>
+            <a:off x="7328565" y="8193427"/>
+            <a:ext cx="1471058" cy="276999"/>
           </a:xfrm>
           <a:prstGeom prst="rect">
             <a:avLst/>
@@ -4917,38 +4494,615 @@
             <a:pPr algn="ctr"/>
             <a:r>
               <a:rPr lang="en-GB" sz="1200" dirty="0" err="1"/>
-              <a:t>DividedCoverage</a:t>
-            </a:r>
+              <a:t>cpg_meth_percent</a:t>
+            </a:r>
+            <a:endParaRPr lang="en-GB" sz="1200" dirty="0"/>
+          </a:p>
+        </p:txBody>
+      </p:sp>
+      <p:sp>
+        <p:nvSpPr>
+          <p:cNvPr id="2" name="Rectangle 1"/>
+          <p:cNvSpPr/>
+          <p:nvPr/>
+        </p:nvSpPr>
+        <p:spPr>
+          <a:xfrm>
+            <a:off x="1144785" y="278150"/>
+            <a:ext cx="6571426" cy="4669332"/>
+          </a:xfrm>
+          <a:prstGeom prst="rect">
+            <a:avLst/>
+          </a:prstGeom>
+          <a:noFill/>
+          <a:ln>
+            <a:prstDash val="dash"/>
+          </a:ln>
+        </p:spPr>
+        <p:style>
+          <a:lnRef idx="2">
+            <a:schemeClr val="accent1">
+              <a:shade val="50000"/>
+            </a:schemeClr>
+          </a:lnRef>
+          <a:fillRef idx="1">
+            <a:schemeClr val="accent1"/>
+          </a:fillRef>
+          <a:effectRef idx="0">
+            <a:schemeClr val="accent1"/>
+          </a:effectRef>
+          <a:fontRef idx="minor">
+            <a:schemeClr val="lt1"/>
+          </a:fontRef>
+        </p:style>
+        <p:txBody>
+          <a:bodyPr rot="0" spcFirstLastPara="0" vertOverflow="overflow" horzOverflow="overflow" vert="horz" wrap="square" lIns="91440" tIns="45720" rIns="91440" bIns="45720" numCol="1" spcCol="0" rtlCol="0" fromWordArt="0" anchor="ctr" anchorCtr="0" forceAA="0" compatLnSpc="1">
+            <a:prstTxWarp prst="textNoShape">
+              <a:avLst/>
+            </a:prstTxWarp>
+            <a:noAutofit/>
+          </a:bodyPr>
+          <a:lstStyle/>
+          <a:p>
+            <a:pPr algn="ctr"/>
+            <a:endParaRPr lang="en-GB"/>
+          </a:p>
+        </p:txBody>
+      </p:sp>
+      <p:sp>
+        <p:nvSpPr>
+          <p:cNvPr id="3" name="Rectangle 2"/>
+          <p:cNvSpPr/>
+          <p:nvPr/>
+        </p:nvSpPr>
+        <p:spPr>
+          <a:xfrm>
+            <a:off x="106282" y="5432921"/>
+            <a:ext cx="2764944" cy="3657724"/>
+          </a:xfrm>
+          <a:prstGeom prst="rect">
+            <a:avLst/>
+          </a:prstGeom>
+          <a:noFill/>
+          <a:ln>
+            <a:prstDash val="dash"/>
+          </a:ln>
+        </p:spPr>
+        <p:style>
+          <a:lnRef idx="2">
+            <a:schemeClr val="accent1">
+              <a:shade val="50000"/>
+            </a:schemeClr>
+          </a:lnRef>
+          <a:fillRef idx="1">
+            <a:schemeClr val="accent1"/>
+          </a:fillRef>
+          <a:effectRef idx="0">
+            <a:schemeClr val="accent1"/>
+          </a:effectRef>
+          <a:fontRef idx="minor">
+            <a:schemeClr val="lt1"/>
+          </a:fontRef>
+        </p:style>
+        <p:txBody>
+          <a:bodyPr rot="0" spcFirstLastPara="0" vertOverflow="overflow" horzOverflow="overflow" vert="horz" wrap="square" lIns="91440" tIns="45720" rIns="91440" bIns="45720" numCol="1" spcCol="0" rtlCol="0" fromWordArt="0" anchor="ctr" anchorCtr="0" forceAA="0" compatLnSpc="1">
+            <a:prstTxWarp prst="textNoShape">
+              <a:avLst/>
+            </a:prstTxWarp>
+            <a:noAutofit/>
+          </a:bodyPr>
+          <a:lstStyle/>
+          <a:p>
+            <a:pPr algn="ctr"/>
+            <a:endParaRPr lang="en-GB"/>
+          </a:p>
+        </p:txBody>
+      </p:sp>
+      <p:sp>
+        <p:nvSpPr>
+          <p:cNvPr id="19" name="TextBox 18"/>
+          <p:cNvSpPr txBox="1"/>
+          <p:nvPr/>
+        </p:nvSpPr>
+        <p:spPr>
+          <a:xfrm>
+            <a:off x="7413966" y="4565159"/>
+            <a:ext cx="316594" cy="369332"/>
+          </a:xfrm>
+          <a:prstGeom prst="rect">
+            <a:avLst/>
+          </a:prstGeom>
+          <a:noFill/>
+        </p:spPr>
+        <p:txBody>
+          <a:bodyPr wrap="square" rtlCol="0">
+            <a:spAutoFit/>
+          </a:bodyPr>
+          <a:lstStyle/>
+          <a:p>
+            <a:r>
+              <a:rPr lang="en-GB" dirty="0">
+                <a:latin typeface="Times New Roman" panose="02020603050405020304" pitchFamily="18" charset="0"/>
+                <a:cs typeface="Times New Roman" panose="02020603050405020304" pitchFamily="18" charset="0"/>
+              </a:rPr>
+              <a:t>I</a:t>
+            </a:r>
+          </a:p>
+        </p:txBody>
+      </p:sp>
+      <p:sp>
+        <p:nvSpPr>
+          <p:cNvPr id="86" name="TextBox 85"/>
+          <p:cNvSpPr txBox="1"/>
+          <p:nvPr/>
+        </p:nvSpPr>
+        <p:spPr>
+          <a:xfrm>
+            <a:off x="2427800" y="8757225"/>
+            <a:ext cx="386439" cy="369332"/>
+          </a:xfrm>
+          <a:prstGeom prst="rect">
+            <a:avLst/>
+          </a:prstGeom>
+          <a:noFill/>
+        </p:spPr>
+        <p:txBody>
+          <a:bodyPr wrap="square" rtlCol="0">
+            <a:spAutoFit/>
+          </a:bodyPr>
+          <a:lstStyle/>
+          <a:p>
+            <a:r>
+              <a:rPr lang="en-GB" dirty="0">
+                <a:latin typeface="Times New Roman" panose="02020603050405020304" pitchFamily="18" charset="0"/>
+                <a:cs typeface="Times New Roman" panose="02020603050405020304" pitchFamily="18" charset="0"/>
+              </a:rPr>
+              <a:t>II</a:t>
+            </a:r>
+          </a:p>
+        </p:txBody>
+      </p:sp>
+      <p:sp>
+        <p:nvSpPr>
+          <p:cNvPr id="90" name="TextBox 89"/>
+          <p:cNvSpPr txBox="1"/>
+          <p:nvPr/>
+        </p:nvSpPr>
+        <p:spPr>
+          <a:xfrm>
+            <a:off x="5696435" y="9803522"/>
+            <a:ext cx="475289" cy="369332"/>
+          </a:xfrm>
+          <a:prstGeom prst="rect">
+            <a:avLst/>
+          </a:prstGeom>
+          <a:noFill/>
+        </p:spPr>
+        <p:txBody>
+          <a:bodyPr wrap="square" rtlCol="0">
+            <a:spAutoFit/>
+          </a:bodyPr>
+          <a:lstStyle/>
+          <a:p>
+            <a:r>
+              <a:rPr lang="en-GB" dirty="0">
+                <a:latin typeface="Times New Roman" panose="02020603050405020304" pitchFamily="18" charset="0"/>
+                <a:cs typeface="Times New Roman" panose="02020603050405020304" pitchFamily="18" charset="0"/>
+              </a:rPr>
+              <a:t>IV</a:t>
+            </a:r>
+            <a:endParaRPr lang="en-GB" dirty="0">
+              <a:latin typeface="Times New Roman" panose="02020603050405020304" pitchFamily="18" charset="0"/>
+              <a:cs typeface="Times New Roman" panose="02020603050405020304" pitchFamily="18" charset="0"/>
+            </a:endParaRPr>
+          </a:p>
+        </p:txBody>
+      </p:sp>
+      <p:sp>
+        <p:nvSpPr>
+          <p:cNvPr id="92" name="TextBox 91"/>
+          <p:cNvSpPr txBox="1"/>
+          <p:nvPr/>
+        </p:nvSpPr>
+        <p:spPr>
+          <a:xfrm>
+            <a:off x="8689324" y="9814248"/>
+            <a:ext cx="475289" cy="369332"/>
+          </a:xfrm>
+          <a:prstGeom prst="rect">
+            <a:avLst/>
+          </a:prstGeom>
+          <a:noFill/>
+        </p:spPr>
+        <p:txBody>
+          <a:bodyPr wrap="square" rtlCol="0">
+            <a:spAutoFit/>
+          </a:bodyPr>
+          <a:lstStyle/>
+          <a:p>
+            <a:r>
+              <a:rPr lang="en-GB" dirty="0">
+                <a:latin typeface="Times New Roman" panose="02020603050405020304" pitchFamily="18" charset="0"/>
+                <a:cs typeface="Times New Roman" panose="02020603050405020304" pitchFamily="18" charset="0"/>
+              </a:rPr>
+              <a:t>V</a:t>
+            </a:r>
+            <a:endParaRPr lang="en-GB" dirty="0">
+              <a:latin typeface="Times New Roman" panose="02020603050405020304" pitchFamily="18" charset="0"/>
+              <a:cs typeface="Times New Roman" panose="02020603050405020304" pitchFamily="18" charset="0"/>
+            </a:endParaRPr>
+          </a:p>
+        </p:txBody>
+      </p:sp>
+      <p:sp>
+        <p:nvSpPr>
+          <p:cNvPr id="22" name="TextBox 21"/>
+          <p:cNvSpPr txBox="1"/>
+          <p:nvPr/>
+        </p:nvSpPr>
+        <p:spPr>
+          <a:xfrm>
+            <a:off x="56529" y="9997215"/>
+            <a:ext cx="1563492" cy="646331"/>
+          </a:xfrm>
+          <a:prstGeom prst="rect">
+            <a:avLst/>
+          </a:prstGeom>
+          <a:noFill/>
+          <a:ln>
+            <a:solidFill>
+              <a:schemeClr val="accent1"/>
+            </a:solidFill>
+          </a:ln>
+        </p:spPr>
+        <p:txBody>
+          <a:bodyPr wrap="square" rtlCol="0">
+            <a:spAutoFit/>
+          </a:bodyPr>
+          <a:lstStyle/>
+          <a:p>
+            <a:r>
+              <a:rPr lang="en-GB" sz="1200" b="1" dirty="0"/>
+              <a:t>Key</a:t>
+            </a:r>
+            <a:endParaRPr lang="en-GB" sz="1200" dirty="0"/>
+          </a:p>
+          <a:p>
             <a:r>
               <a:rPr lang="en-GB" sz="1200" dirty="0"/>
-              <a:t/>
-            </a:r>
-            <a:br>
-              <a:rPr lang="en-GB" sz="1200" dirty="0"/>
-            </a:br>
-            <a:r>
-              <a:rPr lang="en-GB" sz="1200" dirty="0"/>
-              <a:t>Parser</a:t>
-            </a:r>
-          </a:p>
-        </p:txBody>
-      </p:sp>
-      <p:sp>
-        <p:nvSpPr>
-          <p:cNvPr id="153" name="TextBox 152"/>
+              <a:t>        -  output </a:t>
+            </a:r>
+            <a:r>
+              <a:rPr lang="en-GB" sz="1200" dirty="0" smtClean="0"/>
+              <a:t>files</a:t>
+            </a:r>
+            <a:endParaRPr lang="en-GB" sz="1200" dirty="0"/>
+          </a:p>
+          <a:p>
+            <a:r>
+              <a:rPr lang="en-GB" sz="1200" dirty="0" smtClean="0"/>
+              <a:t>        -  optional input</a:t>
+            </a:r>
+            <a:endParaRPr lang="en-GB" sz="1200" dirty="0"/>
+          </a:p>
+        </p:txBody>
+      </p:sp>
+      <p:sp>
+        <p:nvSpPr>
+          <p:cNvPr id="23" name="Rectangle 22"/>
+          <p:cNvSpPr/>
+          <p:nvPr/>
+        </p:nvSpPr>
+        <p:spPr>
+          <a:xfrm>
+            <a:off x="140167" y="10281650"/>
+            <a:ext cx="247410" cy="147006"/>
+          </a:xfrm>
+          <a:prstGeom prst="rect">
+            <a:avLst/>
+          </a:prstGeom>
+          <a:solidFill>
+            <a:schemeClr val="accent6">
+              <a:lumMod val="40000"/>
+              <a:lumOff val="60000"/>
+            </a:schemeClr>
+          </a:solidFill>
+          <a:ln>
+            <a:noFill/>
+          </a:ln>
+        </p:spPr>
+        <p:style>
+          <a:lnRef idx="2">
+            <a:schemeClr val="accent1">
+              <a:shade val="50000"/>
+            </a:schemeClr>
+          </a:lnRef>
+          <a:fillRef idx="1">
+            <a:schemeClr val="accent1"/>
+          </a:fillRef>
+          <a:effectRef idx="0">
+            <a:schemeClr val="accent1"/>
+          </a:effectRef>
+          <a:fontRef idx="minor">
+            <a:schemeClr val="lt1"/>
+          </a:fontRef>
+        </p:style>
+        <p:txBody>
+          <a:bodyPr rot="0" spcFirstLastPara="0" vertOverflow="overflow" horzOverflow="overflow" vert="horz" wrap="square" lIns="91440" tIns="45720" rIns="91440" bIns="45720" numCol="1" spcCol="0" rtlCol="0" fromWordArt="0" anchor="ctr" anchorCtr="0" forceAA="0" compatLnSpc="1">
+            <a:prstTxWarp prst="textNoShape">
+              <a:avLst/>
+            </a:prstTxWarp>
+            <a:noAutofit/>
+          </a:bodyPr>
+          <a:lstStyle/>
+          <a:p>
+            <a:pPr algn="ctr"/>
+            <a:endParaRPr lang="en-GB"/>
+          </a:p>
+        </p:txBody>
+      </p:sp>
+      <p:cxnSp>
+        <p:nvCxnSpPr>
+          <p:cNvPr id="29" name="Straight Arrow Connector 28"/>
+          <p:cNvCxnSpPr>
+            <a:stCxn id="41" idx="1"/>
+            <a:endCxn id="40" idx="3"/>
+          </p:cNvCxnSpPr>
+          <p:nvPr/>
+        </p:nvCxnSpPr>
+        <p:spPr>
+          <a:xfrm flipH="1">
+            <a:off x="2407135" y="2350417"/>
+            <a:ext cx="730249" cy="3752"/>
+          </a:xfrm>
+          <a:prstGeom prst="straightConnector1">
+            <a:avLst/>
+          </a:prstGeom>
+          <a:ln>
+            <a:tailEnd type="triangle"/>
+          </a:ln>
+        </p:spPr>
+        <p:style>
+          <a:lnRef idx="1">
+            <a:schemeClr val="accent1"/>
+          </a:lnRef>
+          <a:fillRef idx="0">
+            <a:schemeClr val="accent1"/>
+          </a:fillRef>
+          <a:effectRef idx="0">
+            <a:schemeClr val="accent1"/>
+          </a:effectRef>
+          <a:fontRef idx="minor">
+            <a:schemeClr val="tx1"/>
+          </a:fontRef>
+        </p:style>
+      </p:cxnSp>
+      <p:sp>
+        <p:nvSpPr>
+          <p:cNvPr id="111" name="Rectangle 110"/>
+          <p:cNvSpPr/>
+          <p:nvPr/>
+        </p:nvSpPr>
+        <p:spPr>
+          <a:xfrm>
+            <a:off x="3124497" y="5432918"/>
+            <a:ext cx="5957681" cy="5210628"/>
+          </a:xfrm>
+          <a:prstGeom prst="rect">
+            <a:avLst/>
+          </a:prstGeom>
+          <a:noFill/>
+          <a:ln>
+            <a:prstDash val="dash"/>
+          </a:ln>
+        </p:spPr>
+        <p:style>
+          <a:lnRef idx="2">
+            <a:schemeClr val="accent1">
+              <a:shade val="50000"/>
+            </a:schemeClr>
+          </a:lnRef>
+          <a:fillRef idx="1">
+            <a:schemeClr val="accent1"/>
+          </a:fillRef>
+          <a:effectRef idx="0">
+            <a:schemeClr val="accent1"/>
+          </a:effectRef>
+          <a:fontRef idx="minor">
+            <a:schemeClr val="lt1"/>
+          </a:fontRef>
+        </p:style>
+        <p:txBody>
+          <a:bodyPr rot="0" spcFirstLastPara="0" vertOverflow="overflow" horzOverflow="overflow" vert="horz" wrap="square" lIns="91440" tIns="45720" rIns="91440" bIns="45720" numCol="1" spcCol="0" rtlCol="0" fromWordArt="0" anchor="ctr" anchorCtr="0" forceAA="0" compatLnSpc="1">
+            <a:prstTxWarp prst="textNoShape">
+              <a:avLst/>
+            </a:prstTxWarp>
+            <a:noAutofit/>
+          </a:bodyPr>
+          <a:lstStyle/>
+          <a:p>
+            <a:pPr algn="ctr"/>
+            <a:endParaRPr lang="en-GB"/>
+          </a:p>
+        </p:txBody>
+      </p:sp>
+      <p:sp>
+        <p:nvSpPr>
+          <p:cNvPr id="113" name="TextBox 112"/>
           <p:cNvSpPr txBox="1"/>
           <p:nvPr/>
         </p:nvSpPr>
         <p:spPr>
           <a:xfrm>
-            <a:off x="3584260" y="10338442"/>
+            <a:off x="8722686" y="10291039"/>
+            <a:ext cx="475289" cy="369332"/>
+          </a:xfrm>
+          <a:prstGeom prst="rect">
+            <a:avLst/>
+          </a:prstGeom>
+          <a:noFill/>
+        </p:spPr>
+        <p:txBody>
+          <a:bodyPr wrap="square" rtlCol="0">
+            <a:spAutoFit/>
+          </a:bodyPr>
+          <a:lstStyle/>
+          <a:p>
+            <a:r>
+              <a:rPr lang="en-GB" dirty="0">
+                <a:latin typeface="Times New Roman" panose="02020603050405020304" pitchFamily="18" charset="0"/>
+                <a:cs typeface="Times New Roman" panose="02020603050405020304" pitchFamily="18" charset="0"/>
+              </a:rPr>
+              <a:t>III</a:t>
+            </a:r>
+            <a:endParaRPr lang="en-GB" dirty="0">
+              <a:latin typeface="Times New Roman" panose="02020603050405020304" pitchFamily="18" charset="0"/>
+              <a:cs typeface="Times New Roman" panose="02020603050405020304" pitchFamily="18" charset="0"/>
+            </a:endParaRPr>
+          </a:p>
+        </p:txBody>
+      </p:sp>
+      <p:cxnSp>
+        <p:nvCxnSpPr>
+          <p:cNvPr id="9" name="Straight Connector 8"/>
+          <p:cNvCxnSpPr>
+            <a:stCxn id="140" idx="2"/>
+          </p:cNvCxnSpPr>
+          <p:nvPr/>
+        </p:nvCxnSpPr>
+        <p:spPr>
+          <a:xfrm>
+            <a:off x="6105844" y="7600955"/>
+            <a:ext cx="0" cy="445169"/>
+          </a:xfrm>
+          <a:prstGeom prst="line">
+            <a:avLst/>
+          </a:prstGeom>
+        </p:spPr>
+        <p:style>
+          <a:lnRef idx="1">
+            <a:schemeClr val="accent1"/>
+          </a:lnRef>
+          <a:fillRef idx="0">
+            <a:schemeClr val="accent1"/>
+          </a:fillRef>
+          <a:effectRef idx="0">
+            <a:schemeClr val="accent1"/>
+          </a:effectRef>
+          <a:fontRef idx="minor">
+            <a:schemeClr val="tx1"/>
+          </a:fontRef>
+        </p:style>
+      </p:cxnSp>
+      <p:cxnSp>
+        <p:nvCxnSpPr>
+          <p:cNvPr id="11" name="Straight Connector 10"/>
+          <p:cNvCxnSpPr/>
+          <p:nvPr/>
+        </p:nvCxnSpPr>
+        <p:spPr>
+          <a:xfrm flipH="1">
+            <a:off x="4395605" y="8048312"/>
+            <a:ext cx="1718652" cy="4029"/>
+          </a:xfrm>
+          <a:prstGeom prst="line">
+            <a:avLst/>
+          </a:prstGeom>
+        </p:spPr>
+        <p:style>
+          <a:lnRef idx="1">
+            <a:schemeClr val="accent1"/>
+          </a:lnRef>
+          <a:fillRef idx="0">
+            <a:schemeClr val="accent1"/>
+          </a:fillRef>
+          <a:effectRef idx="0">
+            <a:schemeClr val="accent1"/>
+          </a:effectRef>
+          <a:fontRef idx="minor">
+            <a:schemeClr val="tx1"/>
+          </a:fontRef>
+        </p:style>
+      </p:cxnSp>
+      <p:cxnSp>
+        <p:nvCxnSpPr>
+          <p:cNvPr id="95" name="Straight Connector 94"/>
+          <p:cNvCxnSpPr/>
+          <p:nvPr/>
+        </p:nvCxnSpPr>
+        <p:spPr>
+          <a:xfrm flipH="1">
+            <a:off x="6103334" y="8048449"/>
+            <a:ext cx="1235094" cy="0"/>
+          </a:xfrm>
+          <a:prstGeom prst="line">
+            <a:avLst/>
+          </a:prstGeom>
+        </p:spPr>
+        <p:style>
+          <a:lnRef idx="1">
+            <a:schemeClr val="accent1"/>
+          </a:lnRef>
+          <a:fillRef idx="0">
+            <a:schemeClr val="accent1"/>
+          </a:fillRef>
+          <a:effectRef idx="0">
+            <a:schemeClr val="accent1"/>
+          </a:effectRef>
+          <a:fontRef idx="minor">
+            <a:schemeClr val="tx1"/>
+          </a:fontRef>
+        </p:style>
+      </p:cxnSp>
+      <p:cxnSp>
+        <p:nvCxnSpPr>
+          <p:cNvPr id="96" name="Straight Arrow Connector 95"/>
+          <p:cNvCxnSpPr/>
+          <p:nvPr/>
+        </p:nvCxnSpPr>
+        <p:spPr>
+          <a:xfrm>
+            <a:off x="7338427" y="8046121"/>
+            <a:ext cx="0" cy="1488370"/>
+          </a:xfrm>
+          <a:prstGeom prst="straightConnector1">
+            <a:avLst/>
+          </a:prstGeom>
+          <a:ln>
+            <a:tailEnd type="triangle"/>
+          </a:ln>
+        </p:spPr>
+        <p:style>
+          <a:lnRef idx="1">
+            <a:schemeClr val="accent1"/>
+          </a:lnRef>
+          <a:fillRef idx="0">
+            <a:schemeClr val="accent1"/>
+          </a:fillRef>
+          <a:effectRef idx="0">
+            <a:schemeClr val="accent1"/>
+          </a:effectRef>
+          <a:fontRef idx="minor">
+            <a:schemeClr val="tx1"/>
+          </a:fontRef>
+        </p:style>
+      </p:cxnSp>
+      <p:sp>
+        <p:nvSpPr>
+          <p:cNvPr id="97" name="TextBox 96"/>
+          <p:cNvSpPr txBox="1"/>
+          <p:nvPr/>
+        </p:nvSpPr>
+        <p:spPr>
+          <a:xfrm>
+            <a:off x="6231157" y="8400407"/>
             <a:ext cx="882732" cy="276999"/>
           </a:xfrm>
           <a:prstGeom prst="rect">
             <a:avLst/>
           </a:prstGeom>
           <a:noFill/>
-          <a:ln cmpd="sng">
+          <a:ln>
             <a:solidFill>
               <a:schemeClr val="accent1">
                 <a:shade val="50000"/>
@@ -4973,20 +5127,21 @@
       </p:sp>
       <p:cxnSp>
         <p:nvCxnSpPr>
-          <p:cNvPr id="155" name="Curved Connector 154"/>
-          <p:cNvCxnSpPr>
-            <a:stCxn id="153" idx="2"/>
-          </p:cNvCxnSpPr>
+          <p:cNvPr id="99" name="Straight Arrow Connector 98"/>
+          <p:cNvCxnSpPr/>
           <p:nvPr/>
         </p:nvCxnSpPr>
         <p:spPr>
-          <a:xfrm rot="16200000" flipH="1">
-            <a:off x="4355841" y="10285226"/>
-            <a:ext cx="199289" cy="859710"/>
-          </a:xfrm>
-          <a:prstGeom prst="curvedConnector2">
-            <a:avLst/>
-          </a:prstGeom>
+          <a:xfrm>
+            <a:off x="4395606" y="8046124"/>
+            <a:ext cx="8466" cy="1488829"/>
+          </a:xfrm>
+          <a:prstGeom prst="straightConnector1">
+            <a:avLst/>
+          </a:prstGeom>
+          <a:ln>
+            <a:tailEnd type="triangle"/>
+          </a:ln>
         </p:spPr>
         <p:style>
           <a:lnRef idx="1">
@@ -5005,53 +5160,57 @@
       </p:cxnSp>
       <p:sp>
         <p:nvSpPr>
-          <p:cNvPr id="156" name="TextBox 155"/>
-          <p:cNvSpPr txBox="1"/>
-          <p:nvPr/>
-        </p:nvSpPr>
-        <p:spPr>
-          <a:xfrm>
-            <a:off x="7600872" y="7771664"/>
-            <a:ext cx="1471058" cy="276999"/>
-          </a:xfrm>
-          <a:prstGeom prst="rect">
-            <a:avLst/>
-          </a:prstGeom>
+          <p:cNvPr id="36" name="Freeform 35"/>
+          <p:cNvSpPr/>
+          <p:nvPr/>
+        </p:nvSpPr>
+        <p:spPr>
+          <a:xfrm>
+            <a:off x="6648645" y="8669589"/>
+            <a:ext cx="685800" cy="292100"/>
+          </a:xfrm>
+          <a:custGeom>
+            <a:avLst/>
+            <a:gdLst>
+              <a:gd name="connsiteX0" fmla="*/ 0 w 685800"/>
+              <a:gd name="connsiteY0" fmla="*/ 0 h 292100"/>
+              <a:gd name="connsiteX1" fmla="*/ 228600 w 685800"/>
+              <a:gd name="connsiteY1" fmla="*/ 215900 h 292100"/>
+              <a:gd name="connsiteX2" fmla="*/ 685800 w 685800"/>
+              <a:gd name="connsiteY2" fmla="*/ 292100 h 292100"/>
+            </a:gdLst>
+            <a:ahLst/>
+            <a:cxnLst>
+              <a:cxn ang="0">
+                <a:pos x="connsiteX0" y="connsiteY0"/>
+              </a:cxn>
+              <a:cxn ang="0">
+                <a:pos x="connsiteX1" y="connsiteY1"/>
+              </a:cxn>
+              <a:cxn ang="0">
+                <a:pos x="connsiteX2" y="connsiteY2"/>
+              </a:cxn>
+            </a:cxnLst>
+            <a:rect l="l" t="t" r="r" b="b"/>
+            <a:pathLst>
+              <a:path w="685800" h="292100">
+                <a:moveTo>
+                  <a:pt x="0" y="0"/>
+                </a:moveTo>
+                <a:cubicBezTo>
+                  <a:pt x="57150" y="83608"/>
+                  <a:pt x="114300" y="167217"/>
+                  <a:pt x="228600" y="215900"/>
+                </a:cubicBezTo>
+                <a:cubicBezTo>
+                  <a:pt x="342900" y="264583"/>
+                  <a:pt x="514350" y="278341"/>
+                  <a:pt x="685800" y="292100"/>
+                </a:cubicBezTo>
+              </a:path>
+            </a:pathLst>
+          </a:custGeom>
           <a:noFill/>
-        </p:spPr>
-        <p:txBody>
-          <a:bodyPr wrap="square" rtlCol="0">
-            <a:spAutoFit/>
-          </a:bodyPr>
-          <a:lstStyle/>
-          <a:p>
-            <a:pPr algn="ctr"/>
-            <a:r>
-              <a:rPr lang="en-GB" sz="1200" dirty="0" err="1"/>
-              <a:t>SiteMethPercParser</a:t>
-            </a:r>
-            <a:endParaRPr lang="en-GB" sz="1200" dirty="0"/>
-          </a:p>
-        </p:txBody>
-      </p:sp>
-      <p:sp>
-        <p:nvSpPr>
-          <p:cNvPr id="2" name="Rectangle 1"/>
-          <p:cNvSpPr/>
-          <p:nvPr/>
-        </p:nvSpPr>
-        <p:spPr>
-          <a:xfrm>
-            <a:off x="1685103" y="113917"/>
-            <a:ext cx="6571426" cy="4669333"/>
-          </a:xfrm>
-          <a:prstGeom prst="rect">
-            <a:avLst/>
-          </a:prstGeom>
-          <a:noFill/>
-          <a:ln>
-            <a:prstDash val="dash"/>
-          </a:ln>
         </p:spPr>
         <p:style>
           <a:lnRef idx="2">
@@ -5085,22 +5244,95 @@
       </p:sp>
       <p:sp>
         <p:nvSpPr>
-          <p:cNvPr id="3" name="Rectangle 2"/>
-          <p:cNvSpPr/>
-          <p:nvPr/>
-        </p:nvSpPr>
-        <p:spPr>
-          <a:xfrm>
-            <a:off x="646600" y="5268686"/>
-            <a:ext cx="2632205" cy="3657724"/>
+          <p:cNvPr id="108" name="TextBox 107"/>
+          <p:cNvSpPr txBox="1"/>
+          <p:nvPr/>
+        </p:nvSpPr>
+        <p:spPr>
+          <a:xfrm>
+            <a:off x="3321887" y="8398370"/>
+            <a:ext cx="882732" cy="276999"/>
           </a:xfrm>
           <a:prstGeom prst="rect">
             <a:avLst/>
           </a:prstGeom>
           <a:noFill/>
           <a:ln>
-            <a:prstDash val="dash"/>
+            <a:solidFill>
+              <a:schemeClr val="accent1">
+                <a:shade val="50000"/>
+              </a:schemeClr>
+            </a:solidFill>
+            <a:prstDash val="solid"/>
           </a:ln>
+        </p:spPr>
+        <p:txBody>
+          <a:bodyPr wrap="square" rtlCol="0">
+            <a:spAutoFit/>
+          </a:bodyPr>
+          <a:lstStyle/>
+          <a:p>
+            <a:pPr algn="ctr"/>
+            <a:r>
+              <a:rPr lang="en-GB" sz="1200" dirty="0"/>
+              <a:t>Amplicon</a:t>
+            </a:r>
+          </a:p>
+        </p:txBody>
+      </p:sp>
+      <p:sp>
+        <p:nvSpPr>
+          <p:cNvPr id="109" name="Freeform 108"/>
+          <p:cNvSpPr/>
+          <p:nvPr/>
+        </p:nvSpPr>
+        <p:spPr>
+          <a:xfrm>
+            <a:off x="3718271" y="8667007"/>
+            <a:ext cx="685800" cy="292100"/>
+          </a:xfrm>
+          <a:custGeom>
+            <a:avLst/>
+            <a:gdLst>
+              <a:gd name="connsiteX0" fmla="*/ 0 w 685800"/>
+              <a:gd name="connsiteY0" fmla="*/ 0 h 292100"/>
+              <a:gd name="connsiteX1" fmla="*/ 228600 w 685800"/>
+              <a:gd name="connsiteY1" fmla="*/ 215900 h 292100"/>
+              <a:gd name="connsiteX2" fmla="*/ 685800 w 685800"/>
+              <a:gd name="connsiteY2" fmla="*/ 292100 h 292100"/>
+            </a:gdLst>
+            <a:ahLst/>
+            <a:cxnLst>
+              <a:cxn ang="0">
+                <a:pos x="connsiteX0" y="connsiteY0"/>
+              </a:cxn>
+              <a:cxn ang="0">
+                <a:pos x="connsiteX1" y="connsiteY1"/>
+              </a:cxn>
+              <a:cxn ang="0">
+                <a:pos x="connsiteX2" y="connsiteY2"/>
+              </a:cxn>
+            </a:cxnLst>
+            <a:rect l="l" t="t" r="r" b="b"/>
+            <a:pathLst>
+              <a:path w="685800" h="292100">
+                <a:moveTo>
+                  <a:pt x="0" y="0"/>
+                </a:moveTo>
+                <a:cubicBezTo>
+                  <a:pt x="57150" y="83608"/>
+                  <a:pt x="114300" y="167217"/>
+                  <a:pt x="228600" y="215900"/>
+                </a:cubicBezTo>
+                <a:cubicBezTo>
+                  <a:pt x="342900" y="264583"/>
+                  <a:pt x="514350" y="278341"/>
+                  <a:pt x="685800" y="292100"/>
+                </a:cubicBezTo>
+              </a:path>
+            </a:pathLst>
+          </a:custGeom>
+          <a:noFill/>
         </p:spPr>
         <p:style>
           <a:lnRef idx="2">
@@ -5134,14 +5366,45 @@
       </p:sp>
       <p:sp>
         <p:nvSpPr>
-          <p:cNvPr id="78" name="Rectangle 77"/>
+          <p:cNvPr id="110" name="TextBox 109"/>
+          <p:cNvSpPr txBox="1"/>
+          <p:nvPr/>
+        </p:nvSpPr>
+        <p:spPr>
+          <a:xfrm>
+            <a:off x="4338565" y="8274289"/>
+            <a:ext cx="1847260" cy="276999"/>
+          </a:xfrm>
+          <a:prstGeom prst="rect">
+            <a:avLst/>
+          </a:prstGeom>
+          <a:noFill/>
+        </p:spPr>
+        <p:txBody>
+          <a:bodyPr wrap="square" rtlCol="0">
+            <a:spAutoFit/>
+          </a:bodyPr>
+          <a:lstStyle/>
+          <a:p>
+            <a:pPr algn="ctr"/>
+            <a:r>
+              <a:rPr lang="en-GB" sz="1200" dirty="0" err="1"/>
+              <a:t>cpg_amplicon_coverager</a:t>
+            </a:r>
+            <a:endParaRPr lang="en-GB" sz="1200" dirty="0"/>
+          </a:p>
+        </p:txBody>
+      </p:sp>
+      <p:sp>
+        <p:nvSpPr>
+          <p:cNvPr id="118" name="Rectangle 117"/>
           <p:cNvSpPr/>
           <p:nvPr/>
         </p:nvSpPr>
         <p:spPr>
           <a:xfrm>
-            <a:off x="3541453" y="6670375"/>
-            <a:ext cx="2768041" cy="4766882"/>
+            <a:off x="3239452" y="8193285"/>
+            <a:ext cx="2831000" cy="1945918"/>
           </a:xfrm>
           <a:prstGeom prst="rect">
             <a:avLst/>
@@ -5183,14 +5446,14 @@
       </p:sp>
       <p:sp>
         <p:nvSpPr>
-          <p:cNvPr id="81" name="Rectangle 80"/>
+          <p:cNvPr id="119" name="Rectangle 118"/>
           <p:cNvSpPr/>
           <p:nvPr/>
         </p:nvSpPr>
         <p:spPr>
           <a:xfrm>
-            <a:off x="6415613" y="6684756"/>
-            <a:ext cx="2768041" cy="2865511"/>
+            <a:off x="6152887" y="8193284"/>
+            <a:ext cx="2807441" cy="1945920"/>
           </a:xfrm>
           <a:prstGeom prst="rect">
             <a:avLst/>
@@ -5230,271 +5493,22 @@
           </a:p>
         </p:txBody>
       </p:sp>
-      <p:sp>
-        <p:nvSpPr>
-          <p:cNvPr id="19" name="TextBox 18"/>
-          <p:cNvSpPr txBox="1"/>
-          <p:nvPr/>
-        </p:nvSpPr>
-        <p:spPr>
-          <a:xfrm>
-            <a:off x="7954285" y="4400927"/>
-            <a:ext cx="316594" cy="369332"/>
-          </a:xfrm>
-          <a:prstGeom prst="rect">
-            <a:avLst/>
-          </a:prstGeom>
-          <a:noFill/>
-        </p:spPr>
-        <p:txBody>
-          <a:bodyPr wrap="square" rtlCol="0">
-            <a:spAutoFit/>
-          </a:bodyPr>
-          <a:lstStyle/>
-          <a:p>
-            <a:r>
-              <a:rPr lang="en-GB" dirty="0">
-                <a:latin typeface="Times New Roman" panose="02020603050405020304" pitchFamily="18" charset="0"/>
-                <a:cs typeface="Times New Roman" panose="02020603050405020304" pitchFamily="18" charset="0"/>
-              </a:rPr>
-              <a:t>I</a:t>
-            </a:r>
-          </a:p>
-        </p:txBody>
-      </p:sp>
-      <p:sp>
-        <p:nvSpPr>
-          <p:cNvPr id="86" name="TextBox 85"/>
-          <p:cNvSpPr txBox="1"/>
-          <p:nvPr/>
-        </p:nvSpPr>
-        <p:spPr>
-          <a:xfrm>
-            <a:off x="2968114" y="8592992"/>
-            <a:ext cx="386439" cy="369332"/>
-          </a:xfrm>
-          <a:prstGeom prst="rect">
-            <a:avLst/>
-          </a:prstGeom>
-          <a:noFill/>
-        </p:spPr>
-        <p:txBody>
-          <a:bodyPr wrap="square" rtlCol="0">
-            <a:spAutoFit/>
-          </a:bodyPr>
-          <a:lstStyle/>
-          <a:p>
-            <a:r>
-              <a:rPr lang="en-GB" dirty="0">
-                <a:latin typeface="Times New Roman" panose="02020603050405020304" pitchFamily="18" charset="0"/>
-                <a:cs typeface="Times New Roman" panose="02020603050405020304" pitchFamily="18" charset="0"/>
-              </a:rPr>
-              <a:t>II</a:t>
-            </a:r>
-          </a:p>
-        </p:txBody>
-      </p:sp>
-      <p:sp>
-        <p:nvSpPr>
-          <p:cNvPr id="90" name="TextBox 89"/>
-          <p:cNvSpPr txBox="1"/>
-          <p:nvPr/>
-        </p:nvSpPr>
-        <p:spPr>
-          <a:xfrm>
-            <a:off x="5940322" y="11079318"/>
-            <a:ext cx="475290" cy="369332"/>
-          </a:xfrm>
-          <a:prstGeom prst="rect">
-            <a:avLst/>
-          </a:prstGeom>
-          <a:noFill/>
-        </p:spPr>
-        <p:txBody>
-          <a:bodyPr wrap="square" rtlCol="0">
-            <a:spAutoFit/>
-          </a:bodyPr>
-          <a:lstStyle/>
-          <a:p>
-            <a:r>
-              <a:rPr lang="en-GB" dirty="0" smtClean="0">
-                <a:latin typeface="Times New Roman" panose="02020603050405020304" pitchFamily="18" charset="0"/>
-                <a:cs typeface="Times New Roman" panose="02020603050405020304" pitchFamily="18" charset="0"/>
-              </a:rPr>
-              <a:t>IV</a:t>
-            </a:r>
-            <a:endParaRPr lang="en-GB" dirty="0">
-              <a:latin typeface="Times New Roman" panose="02020603050405020304" pitchFamily="18" charset="0"/>
-              <a:cs typeface="Times New Roman" panose="02020603050405020304" pitchFamily="18" charset="0"/>
-            </a:endParaRPr>
-          </a:p>
-        </p:txBody>
-      </p:sp>
-      <p:sp>
-        <p:nvSpPr>
-          <p:cNvPr id="92" name="TextBox 91"/>
-          <p:cNvSpPr txBox="1"/>
-          <p:nvPr/>
-        </p:nvSpPr>
-        <p:spPr>
-          <a:xfrm>
-            <a:off x="8848194" y="9200969"/>
-            <a:ext cx="475290" cy="369332"/>
-          </a:xfrm>
-          <a:prstGeom prst="rect">
-            <a:avLst/>
-          </a:prstGeom>
-          <a:noFill/>
-        </p:spPr>
-        <p:txBody>
-          <a:bodyPr wrap="square" rtlCol="0">
-            <a:spAutoFit/>
-          </a:bodyPr>
-          <a:lstStyle/>
-          <a:p>
-            <a:r>
-              <a:rPr lang="en-GB" dirty="0" smtClean="0">
-                <a:latin typeface="Times New Roman" panose="02020603050405020304" pitchFamily="18" charset="0"/>
-                <a:cs typeface="Times New Roman" panose="02020603050405020304" pitchFamily="18" charset="0"/>
-              </a:rPr>
-              <a:t>V</a:t>
-            </a:r>
-            <a:endParaRPr lang="en-GB" dirty="0">
-              <a:latin typeface="Times New Roman" panose="02020603050405020304" pitchFamily="18" charset="0"/>
-              <a:cs typeface="Times New Roman" panose="02020603050405020304" pitchFamily="18" charset="0"/>
-            </a:endParaRPr>
-          </a:p>
-        </p:txBody>
-      </p:sp>
-      <p:grpSp>
-        <p:nvGrpSpPr>
-          <p:cNvPr id="26" name="Group 25"/>
-          <p:cNvGrpSpPr/>
-          <p:nvPr/>
-        </p:nvGrpSpPr>
-        <p:grpSpPr>
-          <a:xfrm>
-            <a:off x="120118" y="11634672"/>
-            <a:ext cx="1563492" cy="461665"/>
-            <a:chOff x="175503" y="11079318"/>
-            <a:chExt cx="1563492" cy="461665"/>
-          </a:xfrm>
-        </p:grpSpPr>
-        <p:sp>
-          <p:nvSpPr>
-            <p:cNvPr id="22" name="TextBox 21"/>
-            <p:cNvSpPr txBox="1"/>
-            <p:nvPr/>
-          </p:nvSpPr>
-          <p:spPr>
-            <a:xfrm>
-              <a:off x="175503" y="11079318"/>
-              <a:ext cx="1563492" cy="461665"/>
-            </a:xfrm>
-            <a:prstGeom prst="rect">
-              <a:avLst/>
-            </a:prstGeom>
-            <a:noFill/>
-            <a:ln>
-              <a:solidFill>
-                <a:schemeClr val="accent1"/>
-              </a:solidFill>
-            </a:ln>
-          </p:spPr>
-          <p:txBody>
-            <a:bodyPr wrap="square" rtlCol="0">
-              <a:spAutoFit/>
-            </a:bodyPr>
-            <a:lstStyle/>
-            <a:p>
-              <a:r>
-                <a:rPr lang="en-GB" sz="1200" b="1" dirty="0"/>
-                <a:t>Key</a:t>
-              </a:r>
-              <a:endParaRPr lang="en-GB" sz="1200" dirty="0"/>
-            </a:p>
-            <a:p>
-              <a:r>
-                <a:rPr lang="en-GB" sz="1200" dirty="0"/>
-                <a:t>        -  output files</a:t>
-              </a:r>
-            </a:p>
-          </p:txBody>
-        </p:sp>
-        <p:sp>
-          <p:nvSpPr>
-            <p:cNvPr id="23" name="Rectangle 22"/>
-            <p:cNvSpPr/>
-            <p:nvPr/>
-          </p:nvSpPr>
-          <p:spPr>
-            <a:xfrm>
-              <a:off x="259141" y="11363754"/>
-              <a:ext cx="247410" cy="147006"/>
-            </a:xfrm>
-            <a:prstGeom prst="rect">
-              <a:avLst/>
-            </a:prstGeom>
-            <a:solidFill>
-              <a:schemeClr val="accent6">
-                <a:lumMod val="40000"/>
-                <a:lumOff val="60000"/>
-              </a:schemeClr>
-            </a:solidFill>
-            <a:ln>
-              <a:noFill/>
-            </a:ln>
-          </p:spPr>
-          <p:style>
-            <a:lnRef idx="2">
-              <a:schemeClr val="accent1">
-                <a:shade val="50000"/>
-              </a:schemeClr>
-            </a:lnRef>
-            <a:fillRef idx="1">
-              <a:schemeClr val="accent1"/>
-            </a:fillRef>
-            <a:effectRef idx="0">
-              <a:schemeClr val="accent1"/>
-            </a:effectRef>
-            <a:fontRef idx="minor">
-              <a:schemeClr val="lt1"/>
-            </a:fontRef>
-          </p:style>
-          <p:txBody>
-            <a:bodyPr rot="0" spcFirstLastPara="0" vertOverflow="overflow" horzOverflow="overflow" vert="horz" wrap="square" lIns="91440" tIns="45720" rIns="91440" bIns="45720" numCol="1" spcCol="0" rtlCol="0" fromWordArt="0" anchor="ctr" anchorCtr="0" forceAA="0" compatLnSpc="1">
-              <a:prstTxWarp prst="textNoShape">
-                <a:avLst/>
-              </a:prstTxWarp>
-              <a:noAutofit/>
-            </a:bodyPr>
-            <a:lstStyle/>
-            <a:p>
-              <a:pPr algn="ctr"/>
-              <a:endParaRPr lang="en-GB"/>
-            </a:p>
-          </p:txBody>
-        </p:sp>
-      </p:grpSp>
       <p:cxnSp>
         <p:nvCxnSpPr>
-          <p:cNvPr id="29" name="Straight Arrow Connector 28"/>
-          <p:cNvCxnSpPr>
-            <a:stCxn id="41" idx="1"/>
-            <a:endCxn id="40" idx="3"/>
-          </p:cNvCxnSpPr>
+          <p:cNvPr id="58" name="Straight Connector 57"/>
+          <p:cNvCxnSpPr/>
           <p:nvPr/>
         </p:nvCxnSpPr>
         <p:spPr>
-          <a:xfrm flipH="1">
-            <a:off x="2947453" y="2186183"/>
-            <a:ext cx="730249" cy="3752"/>
-          </a:xfrm>
-          <a:prstGeom prst="straightConnector1">
+          <a:xfrm>
+            <a:off x="140167" y="10502267"/>
+            <a:ext cx="247410" cy="4556"/>
+          </a:xfrm>
+          <a:prstGeom prst="line">
             <a:avLst/>
           </a:prstGeom>
           <a:ln>
-            <a:tailEnd type="triangle"/>
+            <a:prstDash val="dash"/>
           </a:ln>
         </p:spPr>
         <p:style>
@@ -5512,91 +5526,6 @@
           </a:fontRef>
         </p:style>
       </p:cxnSp>
-      <p:sp>
-        <p:nvSpPr>
-          <p:cNvPr id="111" name="Rectangle 110"/>
-          <p:cNvSpPr/>
-          <p:nvPr/>
-        </p:nvSpPr>
-        <p:spPr>
-          <a:xfrm>
-            <a:off x="3419728" y="5218563"/>
-            <a:ext cx="6043586" cy="6433516"/>
-          </a:xfrm>
-          <a:prstGeom prst="rect">
-            <a:avLst/>
-          </a:prstGeom>
-          <a:noFill/>
-          <a:ln>
-            <a:prstDash val="dash"/>
-          </a:ln>
-        </p:spPr>
-        <p:style>
-          <a:lnRef idx="2">
-            <a:schemeClr val="accent1">
-              <a:shade val="50000"/>
-            </a:schemeClr>
-          </a:lnRef>
-          <a:fillRef idx="1">
-            <a:schemeClr val="accent1"/>
-          </a:fillRef>
-          <a:effectRef idx="0">
-            <a:schemeClr val="accent1"/>
-          </a:effectRef>
-          <a:fontRef idx="minor">
-            <a:schemeClr val="lt1"/>
-          </a:fontRef>
-        </p:style>
-        <p:txBody>
-          <a:bodyPr rot="0" spcFirstLastPara="0" vertOverflow="overflow" horzOverflow="overflow" vert="horz" wrap="square" lIns="91440" tIns="45720" rIns="91440" bIns="45720" numCol="1" spcCol="0" rtlCol="0" fromWordArt="0" anchor="ctr" anchorCtr="0" forceAA="0" compatLnSpc="1">
-            <a:prstTxWarp prst="textNoShape">
-              <a:avLst/>
-            </a:prstTxWarp>
-            <a:noAutofit/>
-          </a:bodyPr>
-          <a:lstStyle/>
-          <a:p>
-            <a:pPr algn="ctr"/>
-            <a:endParaRPr lang="en-GB"/>
-          </a:p>
-        </p:txBody>
-      </p:sp>
-      <p:sp>
-        <p:nvSpPr>
-          <p:cNvPr id="113" name="TextBox 112"/>
-          <p:cNvSpPr txBox="1"/>
-          <p:nvPr/>
-        </p:nvSpPr>
-        <p:spPr>
-          <a:xfrm>
-            <a:off x="9076545" y="11283206"/>
-            <a:ext cx="475290" cy="369332"/>
-          </a:xfrm>
-          <a:prstGeom prst="rect">
-            <a:avLst/>
-          </a:prstGeom>
-          <a:noFill/>
-        </p:spPr>
-        <p:txBody>
-          <a:bodyPr wrap="square" rtlCol="0">
-            <a:spAutoFit/>
-          </a:bodyPr>
-          <a:lstStyle/>
-          <a:p>
-            <a:r>
-              <a:rPr lang="en-GB" dirty="0" smtClean="0">
-                <a:latin typeface="Times New Roman" panose="02020603050405020304" pitchFamily="18" charset="0"/>
-                <a:cs typeface="Times New Roman" panose="02020603050405020304" pitchFamily="18" charset="0"/>
-              </a:rPr>
-              <a:t>III</a:t>
-            </a:r>
-            <a:endParaRPr lang="en-GB" dirty="0">
-              <a:latin typeface="Times New Roman" panose="02020603050405020304" pitchFamily="18" charset="0"/>
-              <a:cs typeface="Times New Roman" panose="02020603050405020304" pitchFamily="18" charset="0"/>
-            </a:endParaRPr>
-          </a:p>
-        </p:txBody>
-      </p:sp>
     </p:spTree>
     <p:extLst>
       <p:ext uri="{BB962C8B-B14F-4D97-AF65-F5344CB8AC3E}">

</xml_diff>

<commit_message>
Numerous documentation errors corrected
</commit_message>
<xml_diff>
--- a/docs/MethyCoverageParser_Image.pptx
+++ b/docs/MethyCoverageParser_Image.pptx
@@ -2987,7 +2987,7 @@
         </p:nvGrpSpPr>
         <p:grpSpPr>
           <a:xfrm>
-            <a:off x="1422469" y="390558"/>
+            <a:off x="720777" y="385409"/>
             <a:ext cx="1054992" cy="677080"/>
             <a:chOff x="1364566" y="393895"/>
             <a:chExt cx="1012874" cy="393896"/>
@@ -3122,9 +3122,9 @@
           <p:nvPr/>
         </p:nvCxnSpPr>
         <p:spPr>
-          <a:xfrm flipV="1">
-            <a:off x="2477464" y="724744"/>
-            <a:ext cx="717469" cy="4354"/>
+          <a:xfrm>
+            <a:off x="1775769" y="723949"/>
+            <a:ext cx="1419161" cy="797"/>
           </a:xfrm>
           <a:prstGeom prst="straightConnector1">
             <a:avLst/>
@@ -3192,7 +3192,7 @@
         </p:nvSpPr>
         <p:spPr>
           <a:xfrm>
-            <a:off x="2425993" y="1971990"/>
+            <a:off x="2136099" y="1972422"/>
             <a:ext cx="698500" cy="276999"/>
           </a:xfrm>
           <a:prstGeom prst="rect">
@@ -3222,7 +3222,7 @@
         </p:nvSpPr>
         <p:spPr>
           <a:xfrm>
-            <a:off x="1356166" y="2215672"/>
+            <a:off x="816019" y="2215038"/>
             <a:ext cx="1050966" cy="276999"/>
           </a:xfrm>
           <a:prstGeom prst="rect">
@@ -3600,8 +3600,8 @@
         </p:nvSpPr>
         <p:spPr>
           <a:xfrm>
-            <a:off x="1340148" y="3940211"/>
-            <a:ext cx="1162861" cy="646331"/>
+            <a:off x="816019" y="3936659"/>
+            <a:ext cx="836173" cy="646331"/>
           </a:xfrm>
           <a:prstGeom prst="rect">
             <a:avLst/>
@@ -3634,9 +3634,9 @@
           <p:nvPr/>
         </p:nvCxnSpPr>
         <p:spPr>
-          <a:xfrm flipH="1">
-            <a:off x="2503010" y="4252945"/>
-            <a:ext cx="1159859" cy="10469"/>
+          <a:xfrm flipH="1" flipV="1">
+            <a:off x="1652192" y="4252507"/>
+            <a:ext cx="2023958" cy="7317"/>
           </a:xfrm>
           <a:prstGeom prst="straightConnector1">
             <a:avLst/>
@@ -4280,7 +4280,6 @@
               <a:rPr lang="en-GB" sz="1200" dirty="0"/>
               <a:t> Coverage</a:t>
             </a:r>
-            <a:endParaRPr lang="en-GB" sz="1200" dirty="0"/>
           </a:p>
         </p:txBody>
       </p:sp>
@@ -4508,8 +4507,8 @@
         </p:nvSpPr>
         <p:spPr>
           <a:xfrm>
-            <a:off x="1144785" y="278150"/>
-            <a:ext cx="6571426" cy="4669332"/>
+            <a:off x="616303" y="278150"/>
+            <a:ext cx="7099908" cy="4669332"/>
           </a:xfrm>
           <a:prstGeom prst="rect">
             <a:avLst/>
@@ -4691,10 +4690,6 @@
               </a:rPr>
               <a:t>IV</a:t>
             </a:r>
-            <a:endParaRPr lang="en-GB" dirty="0">
-              <a:latin typeface="Times New Roman" panose="02020603050405020304" pitchFamily="18" charset="0"/>
-              <a:cs typeface="Times New Roman" panose="02020603050405020304" pitchFamily="18" charset="0"/>
-            </a:endParaRPr>
           </a:p>
         </p:txBody>
       </p:sp>
@@ -4727,10 +4722,6 @@
               </a:rPr>
               <a:t>V</a:t>
             </a:r>
-            <a:endParaRPr lang="en-GB" dirty="0">
-              <a:latin typeface="Times New Roman" panose="02020603050405020304" pitchFamily="18" charset="0"/>
-              <a:cs typeface="Times New Roman" panose="02020603050405020304" pitchFamily="18" charset="0"/>
-            </a:endParaRPr>
           </a:p>
         </p:txBody>
       </p:sp>
@@ -4852,8 +4843,8 @@
         </p:nvCxnSpPr>
         <p:spPr>
           <a:xfrm flipH="1">
-            <a:off x="2407135" y="2350417"/>
-            <a:ext cx="730249" cy="3752"/>
+            <a:off x="1866985" y="2350420"/>
+            <a:ext cx="1270396" cy="3118"/>
           </a:xfrm>
           <a:prstGeom prst="straightConnector1">
             <a:avLst/>
@@ -4955,10 +4946,6 @@
               </a:rPr>
               <a:t>III</a:t>
             </a:r>
-            <a:endParaRPr lang="en-GB" dirty="0">
-              <a:latin typeface="Times New Roman" panose="02020603050405020304" pitchFamily="18" charset="0"/>
-              <a:cs typeface="Times New Roman" panose="02020603050405020304" pitchFamily="18" charset="0"/>
-            </a:endParaRPr>
           </a:p>
         </p:txBody>
       </p:sp>
@@ -5388,8 +5375,8 @@
           <a:p>
             <a:pPr algn="ctr"/>
             <a:r>
-              <a:rPr lang="en-GB" sz="1200" dirty="0" err="1"/>
-              <a:t>cpg_amplicon_coverager</a:t>
+              <a:rPr lang="en-GB" sz="1200" dirty="0" err="1" smtClean="0"/>
+              <a:t>cpg_amplicon_coverage</a:t>
             </a:r>
             <a:endParaRPr lang="en-GB" sz="1200" dirty="0"/>
           </a:p>
@@ -5526,6 +5513,41 @@
           </a:fontRef>
         </p:style>
       </p:cxnSp>
+      <p:sp>
+        <p:nvSpPr>
+          <p:cNvPr id="70" name="TextBox 69"/>
+          <p:cNvSpPr txBox="1"/>
+          <p:nvPr/>
+        </p:nvSpPr>
+        <p:spPr>
+          <a:xfrm>
+            <a:off x="1945997" y="358366"/>
+            <a:ext cx="1032793" cy="276999"/>
+          </a:xfrm>
+          <a:prstGeom prst="rect">
+            <a:avLst/>
+          </a:prstGeom>
+          <a:noFill/>
+        </p:spPr>
+        <p:txBody>
+          <a:bodyPr wrap="square" rtlCol="0">
+            <a:spAutoFit/>
+          </a:bodyPr>
+          <a:lstStyle/>
+          <a:p>
+            <a:pPr algn="ctr"/>
+            <a:r>
+              <a:rPr lang="en-GB" sz="1200" dirty="0" smtClean="0"/>
+              <a:t>s</a:t>
+            </a:r>
+            <a:r>
+              <a:rPr lang="en-GB" sz="1200" dirty="0" smtClean="0"/>
+              <a:t>amples2files</a:t>
+            </a:r>
+            <a:endParaRPr lang="en-GB" sz="1200" dirty="0"/>
+          </a:p>
+        </p:txBody>
+      </p:sp>
     </p:spTree>
     <p:extLst>
       <p:ext uri="{BB962C8B-B14F-4D97-AF65-F5344CB8AC3E}">

</xml_diff>